<commit_message>
first version of filter plugin
</commit_message>
<xml_diff>
--- a/tutorial/ja/images/figures.pptx
+++ b/tutorial/ja/images/figures.pptx
@@ -6,6 +6,7 @@
   </p:sldMasterIdLst>
   <p:sldIdLst>
     <p:sldId id="256" r:id="rId2"/>
+    <p:sldId id="257" r:id="rId3"/>
   </p:sldIdLst>
   <p:sldSz cx="12192000" cy="6858000"/>
   <p:notesSz cx="6858000" cy="9144000"/>
@@ -243,7 +244,7 @@
           <a:p>
             <a:fld id="{E6FC79EB-3D47-AA48-B2B1-4222865B35CA}" type="datetimeFigureOut">
               <a:rPr kumimoji="1" lang="ja-JP" altLang="en-US" smtClean="0"/>
-              <a:t>2016/5/15</a:t>
+              <a:t>2016/8/24</a:t>
             </a:fld>
             <a:endParaRPr kumimoji="1" lang="ja-JP" altLang="en-US"/>
           </a:p>
@@ -445,7 +446,7 @@
           <a:p>
             <a:fld id="{E6FC79EB-3D47-AA48-B2B1-4222865B35CA}" type="datetimeFigureOut">
               <a:rPr kumimoji="1" lang="ja-JP" altLang="en-US" smtClean="0"/>
-              <a:t>2016/5/15</a:t>
+              <a:t>2016/8/24</a:t>
             </a:fld>
             <a:endParaRPr kumimoji="1" lang="ja-JP" altLang="en-US"/>
           </a:p>
@@ -657,7 +658,7 @@
           <a:p>
             <a:fld id="{E6FC79EB-3D47-AA48-B2B1-4222865B35CA}" type="datetimeFigureOut">
               <a:rPr kumimoji="1" lang="ja-JP" altLang="en-US" smtClean="0"/>
-              <a:t>2016/5/15</a:t>
+              <a:t>2016/8/24</a:t>
             </a:fld>
             <a:endParaRPr kumimoji="1" lang="ja-JP" altLang="en-US"/>
           </a:p>
@@ -859,7 +860,7 @@
           <a:p>
             <a:fld id="{E6FC79EB-3D47-AA48-B2B1-4222865B35CA}" type="datetimeFigureOut">
               <a:rPr kumimoji="1" lang="ja-JP" altLang="en-US" smtClean="0"/>
-              <a:t>2016/5/15</a:t>
+              <a:t>2016/8/24</a:t>
             </a:fld>
             <a:endParaRPr kumimoji="1" lang="ja-JP" altLang="en-US"/>
           </a:p>
@@ -1105,7 +1106,7 @@
           <a:p>
             <a:fld id="{E6FC79EB-3D47-AA48-B2B1-4222865B35CA}" type="datetimeFigureOut">
               <a:rPr kumimoji="1" lang="ja-JP" altLang="en-US" smtClean="0"/>
-              <a:t>2016/5/15</a:t>
+              <a:t>2016/8/24</a:t>
             </a:fld>
             <a:endParaRPr kumimoji="1" lang="ja-JP" altLang="en-US"/>
           </a:p>
@@ -1401,7 +1402,7 @@
           <a:p>
             <a:fld id="{E6FC79EB-3D47-AA48-B2B1-4222865B35CA}" type="datetimeFigureOut">
               <a:rPr kumimoji="1" lang="ja-JP" altLang="en-US" smtClean="0"/>
-              <a:t>2016/5/15</a:t>
+              <a:t>2016/8/24</a:t>
             </a:fld>
             <a:endParaRPr kumimoji="1" lang="ja-JP" altLang="en-US"/>
           </a:p>
@@ -1832,7 +1833,7 @@
           <a:p>
             <a:fld id="{E6FC79EB-3D47-AA48-B2B1-4222865B35CA}" type="datetimeFigureOut">
               <a:rPr kumimoji="1" lang="ja-JP" altLang="en-US" smtClean="0"/>
-              <a:t>2016/5/15</a:t>
+              <a:t>2016/8/24</a:t>
             </a:fld>
             <a:endParaRPr kumimoji="1" lang="ja-JP" altLang="en-US"/>
           </a:p>
@@ -1950,7 +1951,7 @@
           <a:p>
             <a:fld id="{E6FC79EB-3D47-AA48-B2B1-4222865B35CA}" type="datetimeFigureOut">
               <a:rPr kumimoji="1" lang="ja-JP" altLang="en-US" smtClean="0"/>
-              <a:t>2016/5/15</a:t>
+              <a:t>2016/8/24</a:t>
             </a:fld>
             <a:endParaRPr kumimoji="1" lang="ja-JP" altLang="en-US"/>
           </a:p>
@@ -2045,7 +2046,7 @@
           <a:p>
             <a:fld id="{E6FC79EB-3D47-AA48-B2B1-4222865B35CA}" type="datetimeFigureOut">
               <a:rPr kumimoji="1" lang="ja-JP" altLang="en-US" smtClean="0"/>
-              <a:t>2016/5/15</a:t>
+              <a:t>2016/8/24</a:t>
             </a:fld>
             <a:endParaRPr kumimoji="1" lang="ja-JP" altLang="en-US"/>
           </a:p>
@@ -2354,7 +2355,7 @@
           <a:p>
             <a:fld id="{E6FC79EB-3D47-AA48-B2B1-4222865B35CA}" type="datetimeFigureOut">
               <a:rPr kumimoji="1" lang="ja-JP" altLang="en-US" smtClean="0"/>
-              <a:t>2016/5/15</a:t>
+              <a:t>2016/8/24</a:t>
             </a:fld>
             <a:endParaRPr kumimoji="1" lang="ja-JP" altLang="en-US"/>
           </a:p>
@@ -2607,7 +2608,7 @@
           <a:p>
             <a:fld id="{E6FC79EB-3D47-AA48-B2B1-4222865B35CA}" type="datetimeFigureOut">
               <a:rPr kumimoji="1" lang="ja-JP" altLang="en-US" smtClean="0"/>
-              <a:t>2016/5/15</a:t>
+              <a:t>2016/8/24</a:t>
             </a:fld>
             <a:endParaRPr kumimoji="1" lang="ja-JP" altLang="en-US"/>
           </a:p>
@@ -2852,7 +2853,7 @@
           <a:p>
             <a:fld id="{E6FC79EB-3D47-AA48-B2B1-4222865B35CA}" type="datetimeFigureOut">
               <a:rPr kumimoji="1" lang="ja-JP" altLang="en-US" smtClean="0"/>
-              <a:t>2016/5/15</a:t>
+              <a:t>2016/8/24</a:t>
             </a:fld>
             <a:endParaRPr kumimoji="1" lang="ja-JP" altLang="en-US"/>
           </a:p>
@@ -5904,6 +5905,3149 @@
 </p:sld>
 </file>
 
+<file path=ppt/slides/slide2.xml><?xml version="1.0" encoding="utf-8"?>
+<p:sld xmlns:a="http://schemas.openxmlformats.org/drawingml/2006/main" xmlns:r="http://schemas.openxmlformats.org/officeDocument/2006/relationships" xmlns:p="http://schemas.openxmlformats.org/presentationml/2006/main">
+  <p:cSld>
+    <p:spTree>
+      <p:nvGrpSpPr>
+        <p:cNvPr id="1" name=""/>
+        <p:cNvGrpSpPr/>
+        <p:nvPr/>
+      </p:nvGrpSpPr>
+      <p:grpSpPr>
+        <a:xfrm>
+          <a:off x="0" y="0"/>
+          <a:ext cx="0" cy="0"/>
+          <a:chOff x="0" y="0"/>
+          <a:chExt cx="0" cy="0"/>
+        </a:xfrm>
+      </p:grpSpPr>
+      <p:sp>
+        <p:nvSpPr>
+          <p:cNvPr id="4" name="角丸四角形 3"/>
+          <p:cNvSpPr/>
+          <p:nvPr/>
+        </p:nvSpPr>
+        <p:spPr>
+          <a:xfrm>
+            <a:off x="3197151" y="584200"/>
+            <a:ext cx="5840589" cy="3241488"/>
+          </a:xfrm>
+          <a:prstGeom prst="roundRect">
+            <a:avLst/>
+          </a:prstGeom>
+          <a:ln w="57150"/>
+        </p:spPr>
+        <p:style>
+          <a:lnRef idx="2">
+            <a:schemeClr val="accent1"/>
+          </a:lnRef>
+          <a:fillRef idx="1">
+            <a:schemeClr val="lt1"/>
+          </a:fillRef>
+          <a:effectRef idx="0">
+            <a:schemeClr val="accent1"/>
+          </a:effectRef>
+          <a:fontRef idx="minor">
+            <a:schemeClr val="dk1"/>
+          </a:fontRef>
+        </p:style>
+        <p:txBody>
+          <a:bodyPr rtlCol="0" anchor="t"/>
+          <a:lstStyle/>
+          <a:p>
+            <a:pPr algn="ctr"/>
+            <a:r>
+              <a:rPr lang="en-US" altLang="ja-JP" sz="2400" b="1" dirty="0" err="1" smtClean="0">
+                <a:solidFill>
+                  <a:schemeClr val="accent1"/>
+                </a:solidFill>
+              </a:rPr>
+              <a:t>EverySense</a:t>
+            </a:r>
+            <a:r>
+              <a:rPr lang="en-US" altLang="ja-JP" sz="2400" b="1" dirty="0" smtClean="0">
+                <a:solidFill>
+                  <a:schemeClr val="accent1"/>
+                </a:solidFill>
+              </a:rPr>
+              <a:t> Server</a:t>
+            </a:r>
+            <a:endParaRPr kumimoji="1" lang="ja-JP" altLang="en-US" sz="2400" b="1" dirty="0">
+              <a:solidFill>
+                <a:schemeClr val="accent1"/>
+              </a:solidFill>
+            </a:endParaRPr>
+          </a:p>
+        </p:txBody>
+      </p:sp>
+      <p:grpSp>
+        <p:nvGrpSpPr>
+          <p:cNvPr id="20" name="図形グループ 19"/>
+          <p:cNvGrpSpPr/>
+          <p:nvPr/>
+        </p:nvGrpSpPr>
+        <p:grpSpPr>
+          <a:xfrm>
+            <a:off x="1963666" y="3076225"/>
+            <a:ext cx="292100" cy="647700"/>
+            <a:chOff x="5181600" y="3937000"/>
+            <a:chExt cx="292100" cy="647700"/>
+          </a:xfrm>
+        </p:grpSpPr>
+        <p:sp>
+          <p:nvSpPr>
+            <p:cNvPr id="2" name="円/楕円 1"/>
+            <p:cNvSpPr/>
+            <p:nvPr/>
+          </p:nvSpPr>
+          <p:spPr>
+            <a:xfrm>
+              <a:off x="5181600" y="3937000"/>
+              <a:ext cx="292100" cy="292100"/>
+            </a:xfrm>
+            <a:prstGeom prst="ellipse">
+              <a:avLst/>
+            </a:prstGeom>
+          </p:spPr>
+          <p:style>
+            <a:lnRef idx="2">
+              <a:schemeClr val="accent1">
+                <a:shade val="50000"/>
+              </a:schemeClr>
+            </a:lnRef>
+            <a:fillRef idx="1">
+              <a:schemeClr val="accent1"/>
+            </a:fillRef>
+            <a:effectRef idx="0">
+              <a:schemeClr val="accent1"/>
+            </a:effectRef>
+            <a:fontRef idx="minor">
+              <a:schemeClr val="lt1"/>
+            </a:fontRef>
+          </p:style>
+          <p:txBody>
+            <a:bodyPr rtlCol="0" anchor="ctr"/>
+            <a:lstStyle/>
+            <a:p>
+              <a:pPr algn="ctr"/>
+              <a:endParaRPr kumimoji="1" lang="ja-JP" altLang="en-US"/>
+            </a:p>
+          </p:txBody>
+        </p:sp>
+        <p:cxnSp>
+          <p:nvCxnSpPr>
+            <p:cNvPr id="5" name="直線コネクタ 4"/>
+            <p:cNvCxnSpPr>
+              <a:stCxn id="2" idx="4"/>
+            </p:cNvCxnSpPr>
+            <p:nvPr/>
+          </p:nvCxnSpPr>
+          <p:spPr>
+            <a:xfrm>
+              <a:off x="5327650" y="4229100"/>
+              <a:ext cx="0" cy="241300"/>
+            </a:xfrm>
+            <a:prstGeom prst="line">
+              <a:avLst/>
+            </a:prstGeom>
+            <a:ln w="38100"/>
+          </p:spPr>
+          <p:style>
+            <a:lnRef idx="1">
+              <a:schemeClr val="accent1"/>
+            </a:lnRef>
+            <a:fillRef idx="0">
+              <a:schemeClr val="accent1"/>
+            </a:fillRef>
+            <a:effectRef idx="0">
+              <a:schemeClr val="accent1"/>
+            </a:effectRef>
+            <a:fontRef idx="minor">
+              <a:schemeClr val="tx1"/>
+            </a:fontRef>
+          </p:style>
+        </p:cxnSp>
+        <p:cxnSp>
+          <p:nvCxnSpPr>
+            <p:cNvPr id="10" name="直線コネクタ 9"/>
+            <p:cNvCxnSpPr/>
+            <p:nvPr/>
+          </p:nvCxnSpPr>
+          <p:spPr>
+            <a:xfrm>
+              <a:off x="5327650" y="4470400"/>
+              <a:ext cx="117475" cy="114300"/>
+            </a:xfrm>
+            <a:prstGeom prst="line">
+              <a:avLst/>
+            </a:prstGeom>
+            <a:ln w="38100"/>
+          </p:spPr>
+          <p:style>
+            <a:lnRef idx="1">
+              <a:schemeClr val="accent1"/>
+            </a:lnRef>
+            <a:fillRef idx="0">
+              <a:schemeClr val="accent1"/>
+            </a:fillRef>
+            <a:effectRef idx="0">
+              <a:schemeClr val="accent1"/>
+            </a:effectRef>
+            <a:fontRef idx="minor">
+              <a:schemeClr val="tx1"/>
+            </a:fontRef>
+          </p:style>
+        </p:cxnSp>
+        <p:cxnSp>
+          <p:nvCxnSpPr>
+            <p:cNvPr id="17" name="直線コネクタ 16"/>
+            <p:cNvCxnSpPr/>
+            <p:nvPr/>
+          </p:nvCxnSpPr>
+          <p:spPr>
+            <a:xfrm flipH="1">
+              <a:off x="5210175" y="4470400"/>
+              <a:ext cx="117475" cy="114300"/>
+            </a:xfrm>
+            <a:prstGeom prst="line">
+              <a:avLst/>
+            </a:prstGeom>
+            <a:ln w="38100"/>
+          </p:spPr>
+          <p:style>
+            <a:lnRef idx="1">
+              <a:schemeClr val="accent1"/>
+            </a:lnRef>
+            <a:fillRef idx="0">
+              <a:schemeClr val="accent1"/>
+            </a:fillRef>
+            <a:effectRef idx="0">
+              <a:schemeClr val="accent1"/>
+            </a:effectRef>
+            <a:fontRef idx="minor">
+              <a:schemeClr val="tx1"/>
+            </a:fontRef>
+          </p:style>
+        </p:cxnSp>
+        <p:cxnSp>
+          <p:nvCxnSpPr>
+            <p:cNvPr id="18" name="直線コネクタ 17"/>
+            <p:cNvCxnSpPr/>
+            <p:nvPr/>
+          </p:nvCxnSpPr>
+          <p:spPr>
+            <a:xfrm>
+              <a:off x="5327650" y="4292600"/>
+              <a:ext cx="117475" cy="114300"/>
+            </a:xfrm>
+            <a:prstGeom prst="line">
+              <a:avLst/>
+            </a:prstGeom>
+            <a:ln w="38100"/>
+          </p:spPr>
+          <p:style>
+            <a:lnRef idx="1">
+              <a:schemeClr val="accent1"/>
+            </a:lnRef>
+            <a:fillRef idx="0">
+              <a:schemeClr val="accent1"/>
+            </a:fillRef>
+            <a:effectRef idx="0">
+              <a:schemeClr val="accent1"/>
+            </a:effectRef>
+            <a:fontRef idx="minor">
+              <a:schemeClr val="tx1"/>
+            </a:fontRef>
+          </p:style>
+        </p:cxnSp>
+        <p:cxnSp>
+          <p:nvCxnSpPr>
+            <p:cNvPr id="19" name="直線コネクタ 18"/>
+            <p:cNvCxnSpPr/>
+            <p:nvPr/>
+          </p:nvCxnSpPr>
+          <p:spPr>
+            <a:xfrm flipH="1">
+              <a:off x="5210175" y="4292600"/>
+              <a:ext cx="117475" cy="114300"/>
+            </a:xfrm>
+            <a:prstGeom prst="line">
+              <a:avLst/>
+            </a:prstGeom>
+            <a:ln w="38100"/>
+          </p:spPr>
+          <p:style>
+            <a:lnRef idx="1">
+              <a:schemeClr val="accent1"/>
+            </a:lnRef>
+            <a:fillRef idx="0">
+              <a:schemeClr val="accent1"/>
+            </a:fillRef>
+            <a:effectRef idx="0">
+              <a:schemeClr val="accent1"/>
+            </a:effectRef>
+            <a:fontRef idx="minor">
+              <a:schemeClr val="tx1"/>
+            </a:fontRef>
+          </p:style>
+        </p:cxnSp>
+      </p:grpSp>
+      <p:sp>
+        <p:nvSpPr>
+          <p:cNvPr id="21" name="テキスト ボックス 20"/>
+          <p:cNvSpPr txBox="1"/>
+          <p:nvPr/>
+        </p:nvSpPr>
+        <p:spPr>
+          <a:xfrm>
+            <a:off x="1680271" y="2553005"/>
+            <a:ext cx="1003801" cy="461665"/>
+          </a:xfrm>
+          <a:prstGeom prst="rect">
+            <a:avLst/>
+          </a:prstGeom>
+          <a:noFill/>
+        </p:spPr>
+        <p:txBody>
+          <a:bodyPr wrap="none" rtlCol="0">
+            <a:spAutoFit/>
+          </a:bodyPr>
+          <a:lstStyle/>
+          <a:p>
+            <a:r>
+              <a:rPr kumimoji="1" lang="ja-JP" altLang="en-US" sz="1200" dirty="0" smtClean="0">
+                <a:latin typeface="HGPSoeiKakugothicUB" charset="-128"/>
+                <a:ea typeface="HGPSoeiKakugothicUB" charset="-128"/>
+                <a:cs typeface="HGPSoeiKakugothicUB" charset="-128"/>
+              </a:rPr>
+              <a:t>ファーム</a:t>
+            </a:r>
+            <a:endParaRPr kumimoji="1" lang="en-US" altLang="ja-JP" sz="1200" dirty="0" smtClean="0">
+              <a:latin typeface="HGPSoeiKakugothicUB" charset="-128"/>
+              <a:ea typeface="HGPSoeiKakugothicUB" charset="-128"/>
+              <a:cs typeface="HGPSoeiKakugothicUB" charset="-128"/>
+            </a:endParaRPr>
+          </a:p>
+          <a:p>
+            <a:r>
+              <a:rPr kumimoji="1" lang="ja-JP" altLang="en-US" sz="1200" dirty="0" smtClean="0">
+                <a:latin typeface="HGPSoeiKakugothicUB" charset="-128"/>
+                <a:ea typeface="HGPSoeiKakugothicUB" charset="-128"/>
+                <a:cs typeface="HGPSoeiKakugothicUB" charset="-128"/>
+              </a:rPr>
+              <a:t>オーナー</a:t>
+            </a:r>
+            <a:r>
+              <a:rPr kumimoji="1" lang="en-US" altLang="ja-JP" sz="1200" dirty="0" smtClean="0">
+                <a:latin typeface="HGPSoeiKakugothicUB" charset="-128"/>
+                <a:ea typeface="HGPSoeiKakugothicUB" charset="-128"/>
+                <a:cs typeface="HGPSoeiKakugothicUB" charset="-128"/>
+              </a:rPr>
+              <a:t> FO</a:t>
+            </a:r>
+            <a:r>
+              <a:rPr kumimoji="1" lang="en-US" altLang="ja-JP" sz="1200" baseline="-25000" dirty="0" smtClean="0">
+                <a:latin typeface="HGPSoeiKakugothicUB" charset="-128"/>
+                <a:ea typeface="HGPSoeiKakugothicUB" charset="-128"/>
+                <a:cs typeface="HGPSoeiKakugothicUB" charset="-128"/>
+              </a:rPr>
+              <a:t>1</a:t>
+            </a:r>
+            <a:endParaRPr kumimoji="1" lang="ja-JP" altLang="en-US" sz="1200" baseline="-25000" dirty="0">
+              <a:latin typeface="HGPSoeiKakugothicUB" charset="-128"/>
+              <a:ea typeface="HGPSoeiKakugothicUB" charset="-128"/>
+              <a:cs typeface="HGPSoeiKakugothicUB" charset="-128"/>
+            </a:endParaRPr>
+          </a:p>
+        </p:txBody>
+      </p:sp>
+      <p:sp>
+        <p:nvSpPr>
+          <p:cNvPr id="28" name="正方形/長方形 27"/>
+          <p:cNvSpPr/>
+          <p:nvPr/>
+        </p:nvSpPr>
+        <p:spPr>
+          <a:xfrm>
+            <a:off x="1951130" y="4222141"/>
+            <a:ext cx="609600" cy="418170"/>
+          </a:xfrm>
+          <a:prstGeom prst="rect">
+            <a:avLst/>
+          </a:prstGeom>
+        </p:spPr>
+        <p:style>
+          <a:lnRef idx="2">
+            <a:schemeClr val="accent2">
+              <a:shade val="50000"/>
+            </a:schemeClr>
+          </a:lnRef>
+          <a:fillRef idx="1">
+            <a:schemeClr val="accent2"/>
+          </a:fillRef>
+          <a:effectRef idx="0">
+            <a:schemeClr val="accent2"/>
+          </a:effectRef>
+          <a:fontRef idx="minor">
+            <a:schemeClr val="lt1"/>
+          </a:fontRef>
+        </p:style>
+        <p:txBody>
+          <a:bodyPr rtlCol="0" anchor="ctr"/>
+          <a:lstStyle/>
+          <a:p>
+            <a:pPr algn="ctr"/>
+            <a:endParaRPr kumimoji="1" lang="ja-JP" altLang="en-US"/>
+          </a:p>
+        </p:txBody>
+      </p:sp>
+      <p:sp>
+        <p:nvSpPr>
+          <p:cNvPr id="29" name="テキスト ボックス 28"/>
+          <p:cNvSpPr txBox="1"/>
+          <p:nvPr/>
+        </p:nvSpPr>
+        <p:spPr>
+          <a:xfrm>
+            <a:off x="1770787" y="3933295"/>
+            <a:ext cx="930063" cy="276999"/>
+          </a:xfrm>
+          <a:prstGeom prst="rect">
+            <a:avLst/>
+          </a:prstGeom>
+          <a:noFill/>
+        </p:spPr>
+        <p:txBody>
+          <a:bodyPr wrap="none" rtlCol="0">
+            <a:spAutoFit/>
+          </a:bodyPr>
+          <a:lstStyle/>
+          <a:p>
+            <a:r>
+              <a:rPr kumimoji="1" lang="ja-JP" altLang="en-US" sz="1200" dirty="0" smtClean="0">
+                <a:latin typeface="HGPSoeiKakugothicUB" charset="-128"/>
+                <a:ea typeface="HGPSoeiKakugothicUB" charset="-128"/>
+                <a:cs typeface="HGPSoeiKakugothicUB" charset="-128"/>
+              </a:rPr>
+              <a:t>デバイス</a:t>
+            </a:r>
+            <a:r>
+              <a:rPr kumimoji="1" lang="en-US" altLang="ja-JP" sz="1200" dirty="0" smtClean="0">
+                <a:latin typeface="HGPSoeiKakugothicUB" charset="-128"/>
+                <a:ea typeface="HGPSoeiKakugothicUB" charset="-128"/>
+                <a:cs typeface="HGPSoeiKakugothicUB" charset="-128"/>
+              </a:rPr>
+              <a:t> D</a:t>
+            </a:r>
+            <a:r>
+              <a:rPr kumimoji="1" lang="en-US" altLang="ja-JP" sz="1200" baseline="-25000" dirty="0" smtClean="0">
+                <a:latin typeface="HGPSoeiKakugothicUB" charset="-128"/>
+                <a:ea typeface="HGPSoeiKakugothicUB" charset="-128"/>
+                <a:cs typeface="HGPSoeiKakugothicUB" charset="-128"/>
+              </a:rPr>
+              <a:t>1</a:t>
+            </a:r>
+            <a:endParaRPr lang="en-US" altLang="ja-JP" sz="1200" baseline="-25000" dirty="0">
+              <a:latin typeface="HGPSoeiKakugothicUB" charset="-128"/>
+              <a:ea typeface="HGPSoeiKakugothicUB" charset="-128"/>
+              <a:cs typeface="HGPSoeiKakugothicUB" charset="-128"/>
+            </a:endParaRPr>
+          </a:p>
+        </p:txBody>
+      </p:sp>
+      <p:sp>
+        <p:nvSpPr>
+          <p:cNvPr id="30" name="正方形/長方形 29"/>
+          <p:cNvSpPr/>
+          <p:nvPr/>
+        </p:nvSpPr>
+        <p:spPr>
+          <a:xfrm>
+            <a:off x="2127658" y="4433566"/>
+            <a:ext cx="211138" cy="163106"/>
+          </a:xfrm>
+          <a:prstGeom prst="rect">
+            <a:avLst/>
+          </a:prstGeom>
+        </p:spPr>
+        <p:style>
+          <a:lnRef idx="2">
+            <a:schemeClr val="accent4">
+              <a:shade val="50000"/>
+            </a:schemeClr>
+          </a:lnRef>
+          <a:fillRef idx="1">
+            <a:schemeClr val="accent4"/>
+          </a:fillRef>
+          <a:effectRef idx="0">
+            <a:schemeClr val="accent4"/>
+          </a:effectRef>
+          <a:fontRef idx="minor">
+            <a:schemeClr val="lt1"/>
+          </a:fontRef>
+        </p:style>
+        <p:txBody>
+          <a:bodyPr rtlCol="0" anchor="ctr"/>
+          <a:lstStyle/>
+          <a:p>
+            <a:pPr algn="ctr"/>
+            <a:endParaRPr kumimoji="1" lang="ja-JP" altLang="en-US"/>
+          </a:p>
+        </p:txBody>
+      </p:sp>
+      <p:sp>
+        <p:nvSpPr>
+          <p:cNvPr id="31" name="テキスト ボックス 30"/>
+          <p:cNvSpPr txBox="1"/>
+          <p:nvPr/>
+        </p:nvSpPr>
+        <p:spPr>
+          <a:xfrm>
+            <a:off x="1885223" y="4181004"/>
+            <a:ext cx="742511" cy="276999"/>
+          </a:xfrm>
+          <a:prstGeom prst="rect">
+            <a:avLst/>
+          </a:prstGeom>
+          <a:noFill/>
+        </p:spPr>
+        <p:txBody>
+          <a:bodyPr wrap="none" rtlCol="0">
+            <a:spAutoFit/>
+          </a:bodyPr>
+          <a:lstStyle/>
+          <a:p>
+            <a:r>
+              <a:rPr kumimoji="1" lang="ja-JP" altLang="en-US" sz="1200" dirty="0" smtClean="0">
+                <a:latin typeface="HGPSoeiKakugothicUB" charset="-128"/>
+                <a:ea typeface="HGPSoeiKakugothicUB" charset="-128"/>
+                <a:cs typeface="HGPSoeiKakugothicUB" charset="-128"/>
+              </a:rPr>
+              <a:t>センサ</a:t>
+            </a:r>
+            <a:r>
+              <a:rPr kumimoji="1" lang="en-US" altLang="ja-JP" sz="1200" dirty="0" smtClean="0">
+                <a:latin typeface="HGPSoeiKakugothicUB" charset="-128"/>
+                <a:ea typeface="HGPSoeiKakugothicUB" charset="-128"/>
+                <a:cs typeface="HGPSoeiKakugothicUB" charset="-128"/>
+              </a:rPr>
+              <a:t>S</a:t>
+            </a:r>
+            <a:r>
+              <a:rPr kumimoji="1" lang="en-US" altLang="ja-JP" sz="1200" baseline="-25000" dirty="0" smtClean="0">
+                <a:latin typeface="HGPSoeiKakugothicUB" charset="-128"/>
+                <a:ea typeface="HGPSoeiKakugothicUB" charset="-128"/>
+                <a:cs typeface="HGPSoeiKakugothicUB" charset="-128"/>
+              </a:rPr>
+              <a:t>1</a:t>
+            </a:r>
+          </a:p>
+        </p:txBody>
+      </p:sp>
+      <p:sp>
+        <p:nvSpPr>
+          <p:cNvPr id="32" name="正方形/長方形 31"/>
+          <p:cNvSpPr/>
+          <p:nvPr/>
+        </p:nvSpPr>
+        <p:spPr>
+          <a:xfrm>
+            <a:off x="2127658" y="4920641"/>
+            <a:ext cx="211138" cy="163106"/>
+          </a:xfrm>
+          <a:prstGeom prst="rect">
+            <a:avLst/>
+          </a:prstGeom>
+        </p:spPr>
+        <p:style>
+          <a:lnRef idx="2">
+            <a:schemeClr val="accent4">
+              <a:shade val="50000"/>
+            </a:schemeClr>
+          </a:lnRef>
+          <a:fillRef idx="1">
+            <a:schemeClr val="accent4"/>
+          </a:fillRef>
+          <a:effectRef idx="0">
+            <a:schemeClr val="accent4"/>
+          </a:effectRef>
+          <a:fontRef idx="minor">
+            <a:schemeClr val="lt1"/>
+          </a:fontRef>
+        </p:style>
+        <p:txBody>
+          <a:bodyPr rtlCol="0" anchor="ctr"/>
+          <a:lstStyle/>
+          <a:p>
+            <a:pPr algn="ctr"/>
+            <a:endParaRPr kumimoji="1" lang="ja-JP" altLang="en-US"/>
+          </a:p>
+        </p:txBody>
+      </p:sp>
+      <p:sp>
+        <p:nvSpPr>
+          <p:cNvPr id="33" name="テキスト ボックス 32"/>
+          <p:cNvSpPr txBox="1"/>
+          <p:nvPr/>
+        </p:nvSpPr>
+        <p:spPr>
+          <a:xfrm>
+            <a:off x="1885223" y="5025191"/>
+            <a:ext cx="742511" cy="276999"/>
+          </a:xfrm>
+          <a:prstGeom prst="rect">
+            <a:avLst/>
+          </a:prstGeom>
+          <a:noFill/>
+        </p:spPr>
+        <p:txBody>
+          <a:bodyPr wrap="none" rtlCol="0">
+            <a:spAutoFit/>
+          </a:bodyPr>
+          <a:lstStyle/>
+          <a:p>
+            <a:r>
+              <a:rPr kumimoji="1" lang="ja-JP" altLang="en-US" sz="1200" dirty="0" smtClean="0">
+                <a:latin typeface="HGPSoeiKakugothicUB" charset="-128"/>
+                <a:ea typeface="HGPSoeiKakugothicUB" charset="-128"/>
+                <a:cs typeface="HGPSoeiKakugothicUB" charset="-128"/>
+              </a:rPr>
+              <a:t>センサ</a:t>
+            </a:r>
+            <a:r>
+              <a:rPr kumimoji="1" lang="en-US" altLang="ja-JP" sz="1200" dirty="0" smtClean="0">
+                <a:latin typeface="HGPSoeiKakugothicUB" charset="-128"/>
+                <a:ea typeface="HGPSoeiKakugothicUB" charset="-128"/>
+                <a:cs typeface="HGPSoeiKakugothicUB" charset="-128"/>
+              </a:rPr>
+              <a:t>S</a:t>
+            </a:r>
+            <a:r>
+              <a:rPr kumimoji="1" lang="en-US" altLang="ja-JP" sz="1200" baseline="-25000" dirty="0" smtClean="0">
+                <a:latin typeface="HGPSoeiKakugothicUB" charset="-128"/>
+                <a:ea typeface="HGPSoeiKakugothicUB" charset="-128"/>
+                <a:cs typeface="HGPSoeiKakugothicUB" charset="-128"/>
+              </a:rPr>
+              <a:t>2</a:t>
+            </a:r>
+          </a:p>
+        </p:txBody>
+      </p:sp>
+      <p:sp>
+        <p:nvSpPr>
+          <p:cNvPr id="34" name="テキスト ボックス 33"/>
+          <p:cNvSpPr txBox="1"/>
+          <p:nvPr/>
+        </p:nvSpPr>
+        <p:spPr>
+          <a:xfrm>
+            <a:off x="2778540" y="3930942"/>
+            <a:ext cx="930063" cy="276999"/>
+          </a:xfrm>
+          <a:prstGeom prst="rect">
+            <a:avLst/>
+          </a:prstGeom>
+          <a:noFill/>
+        </p:spPr>
+        <p:txBody>
+          <a:bodyPr wrap="none" rtlCol="0">
+            <a:spAutoFit/>
+          </a:bodyPr>
+          <a:lstStyle/>
+          <a:p>
+            <a:r>
+              <a:rPr kumimoji="1" lang="ja-JP" altLang="en-US" sz="1200" dirty="0" smtClean="0">
+                <a:latin typeface="HGPSoeiKakugothicUB" charset="-128"/>
+                <a:ea typeface="HGPSoeiKakugothicUB" charset="-128"/>
+                <a:cs typeface="HGPSoeiKakugothicUB" charset="-128"/>
+              </a:rPr>
+              <a:t>デバイス</a:t>
+            </a:r>
+            <a:r>
+              <a:rPr kumimoji="1" lang="en-US" altLang="ja-JP" sz="1200" dirty="0" smtClean="0">
+                <a:latin typeface="HGPSoeiKakugothicUB" charset="-128"/>
+                <a:ea typeface="HGPSoeiKakugothicUB" charset="-128"/>
+                <a:cs typeface="HGPSoeiKakugothicUB" charset="-128"/>
+              </a:rPr>
+              <a:t> D</a:t>
+            </a:r>
+            <a:r>
+              <a:rPr lang="en-US" altLang="ja-JP" sz="1200" baseline="-25000" dirty="0">
+                <a:latin typeface="HGPSoeiKakugothicUB" charset="-128"/>
+                <a:ea typeface="HGPSoeiKakugothicUB" charset="-128"/>
+                <a:cs typeface="HGPSoeiKakugothicUB" charset="-128"/>
+              </a:rPr>
+              <a:t>2</a:t>
+            </a:r>
+            <a:endParaRPr kumimoji="1" lang="en-US" altLang="ja-JP" sz="1200" baseline="-25000" dirty="0" smtClean="0">
+              <a:latin typeface="HGPSoeiKakugothicUB" charset="-128"/>
+              <a:ea typeface="HGPSoeiKakugothicUB" charset="-128"/>
+              <a:cs typeface="HGPSoeiKakugothicUB" charset="-128"/>
+            </a:endParaRPr>
+          </a:p>
+        </p:txBody>
+      </p:sp>
+      <p:grpSp>
+        <p:nvGrpSpPr>
+          <p:cNvPr id="39" name="図形グループ 38"/>
+          <p:cNvGrpSpPr/>
+          <p:nvPr/>
+        </p:nvGrpSpPr>
+        <p:grpSpPr>
+          <a:xfrm rot="-2700000">
+            <a:off x="2010366" y="4732624"/>
+            <a:ext cx="445723" cy="445723"/>
+            <a:chOff x="4742656" y="4758033"/>
+            <a:chExt cx="1100138" cy="1100138"/>
+          </a:xfrm>
+        </p:grpSpPr>
+        <p:sp>
+          <p:nvSpPr>
+            <p:cNvPr id="36" name="円弧 35"/>
+            <p:cNvSpPr/>
+            <p:nvPr/>
+          </p:nvSpPr>
+          <p:spPr>
+            <a:xfrm>
+              <a:off x="5010150" y="5025527"/>
+              <a:ext cx="565150" cy="565150"/>
+            </a:xfrm>
+            <a:prstGeom prst="arc">
+              <a:avLst/>
+            </a:prstGeom>
+            <a:ln w="28575">
+              <a:solidFill>
+                <a:schemeClr val="tx1"/>
+              </a:solidFill>
+            </a:ln>
+          </p:spPr>
+          <p:style>
+            <a:lnRef idx="1">
+              <a:schemeClr val="accent1"/>
+            </a:lnRef>
+            <a:fillRef idx="0">
+              <a:schemeClr val="accent1"/>
+            </a:fillRef>
+            <a:effectRef idx="0">
+              <a:schemeClr val="accent1"/>
+            </a:effectRef>
+            <a:fontRef idx="minor">
+              <a:schemeClr val="tx1"/>
+            </a:fontRef>
+          </p:style>
+          <p:txBody>
+            <a:bodyPr rtlCol="0" anchor="ctr"/>
+            <a:lstStyle/>
+            <a:p>
+              <a:pPr algn="ctr"/>
+              <a:endParaRPr kumimoji="1" lang="ja-JP" altLang="en-US"/>
+            </a:p>
+          </p:txBody>
+        </p:sp>
+        <p:sp>
+          <p:nvSpPr>
+            <p:cNvPr id="37" name="円弧 36"/>
+            <p:cNvSpPr/>
+            <p:nvPr/>
+          </p:nvSpPr>
+          <p:spPr>
+            <a:xfrm>
+              <a:off x="4879975" y="4895352"/>
+              <a:ext cx="825500" cy="825500"/>
+            </a:xfrm>
+            <a:prstGeom prst="arc">
+              <a:avLst/>
+            </a:prstGeom>
+            <a:ln w="28575">
+              <a:solidFill>
+                <a:schemeClr val="tx1"/>
+              </a:solidFill>
+            </a:ln>
+          </p:spPr>
+          <p:style>
+            <a:lnRef idx="1">
+              <a:schemeClr val="accent1"/>
+            </a:lnRef>
+            <a:fillRef idx="0">
+              <a:schemeClr val="accent1"/>
+            </a:fillRef>
+            <a:effectRef idx="0">
+              <a:schemeClr val="accent1"/>
+            </a:effectRef>
+            <a:fontRef idx="minor">
+              <a:schemeClr val="tx1"/>
+            </a:fontRef>
+          </p:style>
+          <p:txBody>
+            <a:bodyPr rtlCol="0" anchor="ctr"/>
+            <a:lstStyle/>
+            <a:p>
+              <a:pPr algn="ctr"/>
+              <a:endParaRPr kumimoji="1" lang="ja-JP" altLang="en-US"/>
+            </a:p>
+          </p:txBody>
+        </p:sp>
+        <p:sp>
+          <p:nvSpPr>
+            <p:cNvPr id="38" name="円弧 37"/>
+            <p:cNvSpPr/>
+            <p:nvPr/>
+          </p:nvSpPr>
+          <p:spPr>
+            <a:xfrm>
+              <a:off x="4742656" y="4758033"/>
+              <a:ext cx="1100138" cy="1100138"/>
+            </a:xfrm>
+            <a:prstGeom prst="arc">
+              <a:avLst/>
+            </a:prstGeom>
+            <a:ln w="28575">
+              <a:solidFill>
+                <a:schemeClr val="tx1"/>
+              </a:solidFill>
+            </a:ln>
+          </p:spPr>
+          <p:style>
+            <a:lnRef idx="1">
+              <a:schemeClr val="accent1"/>
+            </a:lnRef>
+            <a:fillRef idx="0">
+              <a:schemeClr val="accent1"/>
+            </a:fillRef>
+            <a:effectRef idx="0">
+              <a:schemeClr val="accent1"/>
+            </a:effectRef>
+            <a:fontRef idx="minor">
+              <a:schemeClr val="tx1"/>
+            </a:fontRef>
+          </p:style>
+          <p:txBody>
+            <a:bodyPr rtlCol="0" anchor="ctr"/>
+            <a:lstStyle/>
+            <a:p>
+              <a:pPr algn="ctr"/>
+              <a:endParaRPr kumimoji="1" lang="ja-JP" altLang="en-US"/>
+            </a:p>
+          </p:txBody>
+        </p:sp>
+      </p:grpSp>
+      <p:sp>
+        <p:nvSpPr>
+          <p:cNvPr id="40" name="テキスト ボックス 39"/>
+          <p:cNvSpPr txBox="1"/>
+          <p:nvPr/>
+        </p:nvSpPr>
+        <p:spPr>
+          <a:xfrm>
+            <a:off x="2778540" y="4600801"/>
+            <a:ext cx="962123" cy="276999"/>
+          </a:xfrm>
+          <a:prstGeom prst="rect">
+            <a:avLst/>
+          </a:prstGeom>
+          <a:noFill/>
+        </p:spPr>
+        <p:txBody>
+          <a:bodyPr wrap="none" rtlCol="0">
+            <a:spAutoFit/>
+          </a:bodyPr>
+          <a:lstStyle/>
+          <a:p>
+            <a:r>
+              <a:rPr kumimoji="1" lang="ja-JP" altLang="en-US" sz="1200" dirty="0" smtClean="0">
+                <a:latin typeface="HGPSoeiKakugothicUB" charset="-128"/>
+                <a:ea typeface="HGPSoeiKakugothicUB" charset="-128"/>
+                <a:cs typeface="HGPSoeiKakugothicUB" charset="-128"/>
+              </a:rPr>
+              <a:t>デバイス</a:t>
+            </a:r>
+            <a:r>
+              <a:rPr kumimoji="1" lang="en-US" altLang="ja-JP" sz="1200" dirty="0" smtClean="0">
+                <a:latin typeface="HGPSoeiKakugothicUB" charset="-128"/>
+                <a:ea typeface="HGPSoeiKakugothicUB" charset="-128"/>
+                <a:cs typeface="HGPSoeiKakugothicUB" charset="-128"/>
+              </a:rPr>
+              <a:t> D</a:t>
+            </a:r>
+            <a:r>
+              <a:rPr kumimoji="1" lang="en-US" altLang="ja-JP" sz="1200" baseline="-25000" dirty="0" smtClean="0">
+                <a:latin typeface="HGPSoeiKakugothicUB" charset="-128"/>
+                <a:ea typeface="HGPSoeiKakugothicUB" charset="-128"/>
+                <a:cs typeface="HGPSoeiKakugothicUB" charset="-128"/>
+              </a:rPr>
+              <a:t>3</a:t>
+            </a:r>
+          </a:p>
+        </p:txBody>
+      </p:sp>
+      <p:sp>
+        <p:nvSpPr>
+          <p:cNvPr id="41" name="正方形/長方形 40"/>
+          <p:cNvSpPr/>
+          <p:nvPr/>
+        </p:nvSpPr>
+        <p:spPr>
+          <a:xfrm>
+            <a:off x="2953839" y="4191363"/>
+            <a:ext cx="609600" cy="448948"/>
+          </a:xfrm>
+          <a:prstGeom prst="rect">
+            <a:avLst/>
+          </a:prstGeom>
+        </p:spPr>
+        <p:style>
+          <a:lnRef idx="2">
+            <a:schemeClr val="accent2">
+              <a:shade val="50000"/>
+            </a:schemeClr>
+          </a:lnRef>
+          <a:fillRef idx="1">
+            <a:schemeClr val="accent2"/>
+          </a:fillRef>
+          <a:effectRef idx="0">
+            <a:schemeClr val="accent2"/>
+          </a:effectRef>
+          <a:fontRef idx="minor">
+            <a:schemeClr val="lt1"/>
+          </a:fontRef>
+        </p:style>
+        <p:txBody>
+          <a:bodyPr rtlCol="0" anchor="ctr"/>
+          <a:lstStyle/>
+          <a:p>
+            <a:pPr algn="ctr"/>
+            <a:endParaRPr kumimoji="1" lang="ja-JP" altLang="en-US"/>
+          </a:p>
+        </p:txBody>
+      </p:sp>
+      <p:sp>
+        <p:nvSpPr>
+          <p:cNvPr id="42" name="テキスト ボックス 41"/>
+          <p:cNvSpPr txBox="1"/>
+          <p:nvPr/>
+        </p:nvSpPr>
+        <p:spPr>
+          <a:xfrm>
+            <a:off x="2900632" y="4162926"/>
+            <a:ext cx="742511" cy="276999"/>
+          </a:xfrm>
+          <a:prstGeom prst="rect">
+            <a:avLst/>
+          </a:prstGeom>
+          <a:noFill/>
+        </p:spPr>
+        <p:txBody>
+          <a:bodyPr wrap="none" rtlCol="0">
+            <a:spAutoFit/>
+          </a:bodyPr>
+          <a:lstStyle/>
+          <a:p>
+            <a:r>
+              <a:rPr kumimoji="1" lang="ja-JP" altLang="en-US" sz="1200" dirty="0" smtClean="0">
+                <a:latin typeface="HGPSoeiKakugothicUB" charset="-128"/>
+                <a:ea typeface="HGPSoeiKakugothicUB" charset="-128"/>
+                <a:cs typeface="HGPSoeiKakugothicUB" charset="-128"/>
+              </a:rPr>
+              <a:t>センサ</a:t>
+            </a:r>
+            <a:r>
+              <a:rPr kumimoji="1" lang="en-US" altLang="ja-JP" sz="1200" dirty="0" smtClean="0">
+                <a:latin typeface="HGPSoeiKakugothicUB" charset="-128"/>
+                <a:ea typeface="HGPSoeiKakugothicUB" charset="-128"/>
+                <a:cs typeface="HGPSoeiKakugothicUB" charset="-128"/>
+              </a:rPr>
+              <a:t>S</a:t>
+            </a:r>
+            <a:r>
+              <a:rPr kumimoji="1" lang="en-US" altLang="ja-JP" sz="1200" baseline="-25000" dirty="0" smtClean="0">
+                <a:latin typeface="HGPSoeiKakugothicUB" charset="-128"/>
+                <a:ea typeface="HGPSoeiKakugothicUB" charset="-128"/>
+                <a:cs typeface="HGPSoeiKakugothicUB" charset="-128"/>
+              </a:rPr>
+              <a:t>3</a:t>
+            </a:r>
+          </a:p>
+        </p:txBody>
+      </p:sp>
+      <p:sp>
+        <p:nvSpPr>
+          <p:cNvPr id="43" name="正方形/長方形 42"/>
+          <p:cNvSpPr/>
+          <p:nvPr/>
+        </p:nvSpPr>
+        <p:spPr>
+          <a:xfrm>
+            <a:off x="2953839" y="4848286"/>
+            <a:ext cx="609600" cy="470922"/>
+          </a:xfrm>
+          <a:prstGeom prst="rect">
+            <a:avLst/>
+          </a:prstGeom>
+        </p:spPr>
+        <p:style>
+          <a:lnRef idx="2">
+            <a:schemeClr val="accent2">
+              <a:shade val="50000"/>
+            </a:schemeClr>
+          </a:lnRef>
+          <a:fillRef idx="1">
+            <a:schemeClr val="accent2"/>
+          </a:fillRef>
+          <a:effectRef idx="0">
+            <a:schemeClr val="accent2"/>
+          </a:effectRef>
+          <a:fontRef idx="minor">
+            <a:schemeClr val="lt1"/>
+          </a:fontRef>
+        </p:style>
+        <p:txBody>
+          <a:bodyPr rtlCol="0" anchor="ctr"/>
+          <a:lstStyle/>
+          <a:p>
+            <a:pPr algn="ctr"/>
+            <a:endParaRPr kumimoji="1" lang="ja-JP" altLang="en-US"/>
+          </a:p>
+        </p:txBody>
+      </p:sp>
+      <p:sp>
+        <p:nvSpPr>
+          <p:cNvPr id="44" name="テキスト ボックス 43"/>
+          <p:cNvSpPr txBox="1"/>
+          <p:nvPr/>
+        </p:nvSpPr>
+        <p:spPr>
+          <a:xfrm>
+            <a:off x="2901970" y="4829685"/>
+            <a:ext cx="742511" cy="276999"/>
+          </a:xfrm>
+          <a:prstGeom prst="rect">
+            <a:avLst/>
+          </a:prstGeom>
+          <a:noFill/>
+        </p:spPr>
+        <p:txBody>
+          <a:bodyPr wrap="none" rtlCol="0">
+            <a:spAutoFit/>
+          </a:bodyPr>
+          <a:lstStyle/>
+          <a:p>
+            <a:r>
+              <a:rPr kumimoji="1" lang="ja-JP" altLang="en-US" sz="1200" dirty="0" smtClean="0">
+                <a:latin typeface="HGPSoeiKakugothicUB" charset="-128"/>
+                <a:ea typeface="HGPSoeiKakugothicUB" charset="-128"/>
+                <a:cs typeface="HGPSoeiKakugothicUB" charset="-128"/>
+              </a:rPr>
+              <a:t>センサ</a:t>
+            </a:r>
+            <a:r>
+              <a:rPr kumimoji="1" lang="en-US" altLang="ja-JP" sz="1200" dirty="0" smtClean="0">
+                <a:latin typeface="HGPSoeiKakugothicUB" charset="-128"/>
+                <a:ea typeface="HGPSoeiKakugothicUB" charset="-128"/>
+                <a:cs typeface="HGPSoeiKakugothicUB" charset="-128"/>
+              </a:rPr>
+              <a:t>S</a:t>
+            </a:r>
+            <a:r>
+              <a:rPr kumimoji="1" lang="en-US" altLang="ja-JP" sz="1200" baseline="-25000" dirty="0" smtClean="0">
+                <a:latin typeface="HGPSoeiKakugothicUB" charset="-128"/>
+                <a:ea typeface="HGPSoeiKakugothicUB" charset="-128"/>
+                <a:cs typeface="HGPSoeiKakugothicUB" charset="-128"/>
+              </a:rPr>
+              <a:t>4</a:t>
+            </a:r>
+          </a:p>
+        </p:txBody>
+      </p:sp>
+      <p:sp>
+        <p:nvSpPr>
+          <p:cNvPr id="45" name="正方形/長方形 44"/>
+          <p:cNvSpPr/>
+          <p:nvPr/>
+        </p:nvSpPr>
+        <p:spPr>
+          <a:xfrm>
+            <a:off x="3138002" y="4413789"/>
+            <a:ext cx="211138" cy="163106"/>
+          </a:xfrm>
+          <a:prstGeom prst="rect">
+            <a:avLst/>
+          </a:prstGeom>
+        </p:spPr>
+        <p:style>
+          <a:lnRef idx="2">
+            <a:schemeClr val="accent4">
+              <a:shade val="50000"/>
+            </a:schemeClr>
+          </a:lnRef>
+          <a:fillRef idx="1">
+            <a:schemeClr val="accent4"/>
+          </a:fillRef>
+          <a:effectRef idx="0">
+            <a:schemeClr val="accent4"/>
+          </a:effectRef>
+          <a:fontRef idx="minor">
+            <a:schemeClr val="lt1"/>
+          </a:fontRef>
+        </p:style>
+        <p:txBody>
+          <a:bodyPr rtlCol="0" anchor="ctr"/>
+          <a:lstStyle/>
+          <a:p>
+            <a:pPr algn="ctr"/>
+            <a:endParaRPr kumimoji="1" lang="ja-JP" altLang="en-US"/>
+          </a:p>
+        </p:txBody>
+      </p:sp>
+      <p:sp>
+        <p:nvSpPr>
+          <p:cNvPr id="46" name="正方形/長方形 45"/>
+          <p:cNvSpPr/>
+          <p:nvPr/>
+        </p:nvSpPr>
+        <p:spPr>
+          <a:xfrm>
+            <a:off x="3138002" y="5082117"/>
+            <a:ext cx="211138" cy="163106"/>
+          </a:xfrm>
+          <a:prstGeom prst="rect">
+            <a:avLst/>
+          </a:prstGeom>
+        </p:spPr>
+        <p:style>
+          <a:lnRef idx="2">
+            <a:schemeClr val="accent4">
+              <a:shade val="50000"/>
+            </a:schemeClr>
+          </a:lnRef>
+          <a:fillRef idx="1">
+            <a:schemeClr val="accent4"/>
+          </a:fillRef>
+          <a:effectRef idx="0">
+            <a:schemeClr val="accent4"/>
+          </a:effectRef>
+          <a:fontRef idx="minor">
+            <a:schemeClr val="lt1"/>
+          </a:fontRef>
+        </p:style>
+        <p:txBody>
+          <a:bodyPr rtlCol="0" anchor="ctr"/>
+          <a:lstStyle/>
+          <a:p>
+            <a:pPr algn="ctr"/>
+            <a:endParaRPr kumimoji="1" lang="ja-JP" altLang="en-US"/>
+          </a:p>
+        </p:txBody>
+      </p:sp>
+      <p:sp>
+        <p:nvSpPr>
+          <p:cNvPr id="47" name="角丸四角形 46"/>
+          <p:cNvSpPr/>
+          <p:nvPr/>
+        </p:nvSpPr>
+        <p:spPr>
+          <a:xfrm>
+            <a:off x="3453017" y="1981286"/>
+            <a:ext cx="923627" cy="1565955"/>
+          </a:xfrm>
+          <a:prstGeom prst="roundRect">
+            <a:avLst/>
+          </a:prstGeom>
+        </p:spPr>
+        <p:style>
+          <a:lnRef idx="2">
+            <a:schemeClr val="accent1">
+              <a:shade val="50000"/>
+            </a:schemeClr>
+          </a:lnRef>
+          <a:fillRef idx="1">
+            <a:schemeClr val="accent1"/>
+          </a:fillRef>
+          <a:effectRef idx="0">
+            <a:schemeClr val="accent1"/>
+          </a:effectRef>
+          <a:fontRef idx="minor">
+            <a:schemeClr val="lt1"/>
+          </a:fontRef>
+        </p:style>
+        <p:txBody>
+          <a:bodyPr rtlCol="0" anchor="ctr"/>
+          <a:lstStyle/>
+          <a:p>
+            <a:pPr algn="ctr"/>
+            <a:endParaRPr kumimoji="1" lang="ja-JP" altLang="en-US"/>
+          </a:p>
+        </p:txBody>
+      </p:sp>
+      <p:sp>
+        <p:nvSpPr>
+          <p:cNvPr id="48" name="テキスト ボックス 47"/>
+          <p:cNvSpPr txBox="1"/>
+          <p:nvPr/>
+        </p:nvSpPr>
+        <p:spPr>
+          <a:xfrm>
+            <a:off x="3442611" y="1708117"/>
+            <a:ext cx="886781" cy="276999"/>
+          </a:xfrm>
+          <a:prstGeom prst="rect">
+            <a:avLst/>
+          </a:prstGeom>
+          <a:noFill/>
+        </p:spPr>
+        <p:txBody>
+          <a:bodyPr wrap="none" rtlCol="0">
+            <a:spAutoFit/>
+          </a:bodyPr>
+          <a:lstStyle/>
+          <a:p>
+            <a:r>
+              <a:rPr kumimoji="1" lang="ja-JP" altLang="en-US" sz="1200" dirty="0" smtClean="0">
+                <a:latin typeface="HGPSoeiKakugothicUB" charset="-128"/>
+                <a:ea typeface="HGPSoeiKakugothicUB" charset="-128"/>
+                <a:cs typeface="HGPSoeiKakugothicUB" charset="-128"/>
+              </a:rPr>
+              <a:t>ファーム</a:t>
+            </a:r>
+            <a:r>
+              <a:rPr kumimoji="1" lang="en-US" altLang="ja-JP" sz="1200" dirty="0" smtClean="0">
+                <a:latin typeface="HGPSoeiKakugothicUB" charset="-128"/>
+                <a:ea typeface="HGPSoeiKakugothicUB" charset="-128"/>
+                <a:cs typeface="HGPSoeiKakugothicUB" charset="-128"/>
+              </a:rPr>
+              <a:t> F</a:t>
+            </a:r>
+            <a:r>
+              <a:rPr kumimoji="1" lang="en-US" altLang="ja-JP" sz="1200" baseline="-25000" dirty="0" smtClean="0">
+                <a:latin typeface="HGPSoeiKakugothicUB" charset="-128"/>
+                <a:ea typeface="HGPSoeiKakugothicUB" charset="-128"/>
+                <a:cs typeface="HGPSoeiKakugothicUB" charset="-128"/>
+              </a:rPr>
+              <a:t>1</a:t>
+            </a:r>
+          </a:p>
+        </p:txBody>
+      </p:sp>
+      <p:sp>
+        <p:nvSpPr>
+          <p:cNvPr id="49" name="テキスト ボックス 48"/>
+          <p:cNvSpPr txBox="1"/>
+          <p:nvPr/>
+        </p:nvSpPr>
+        <p:spPr>
+          <a:xfrm>
+            <a:off x="4495310" y="1708116"/>
+            <a:ext cx="886781" cy="276999"/>
+          </a:xfrm>
+          <a:prstGeom prst="rect">
+            <a:avLst/>
+          </a:prstGeom>
+          <a:noFill/>
+        </p:spPr>
+        <p:txBody>
+          <a:bodyPr wrap="none" rtlCol="0">
+            <a:spAutoFit/>
+          </a:bodyPr>
+          <a:lstStyle/>
+          <a:p>
+            <a:r>
+              <a:rPr kumimoji="1" lang="ja-JP" altLang="en-US" sz="1200" dirty="0" smtClean="0">
+                <a:latin typeface="HGPSoeiKakugothicUB" charset="-128"/>
+                <a:ea typeface="HGPSoeiKakugothicUB" charset="-128"/>
+                <a:cs typeface="HGPSoeiKakugothicUB" charset="-128"/>
+              </a:rPr>
+              <a:t>ファーム</a:t>
+            </a:r>
+            <a:r>
+              <a:rPr kumimoji="1" lang="en-US" altLang="ja-JP" sz="1200" dirty="0" smtClean="0">
+                <a:latin typeface="HGPSoeiKakugothicUB" charset="-128"/>
+                <a:ea typeface="HGPSoeiKakugothicUB" charset="-128"/>
+                <a:cs typeface="HGPSoeiKakugothicUB" charset="-128"/>
+              </a:rPr>
+              <a:t> F</a:t>
+            </a:r>
+            <a:r>
+              <a:rPr kumimoji="1" lang="en-US" altLang="ja-JP" sz="1200" baseline="-25000" dirty="0" smtClean="0">
+                <a:latin typeface="HGPSoeiKakugothicUB" charset="-128"/>
+                <a:ea typeface="HGPSoeiKakugothicUB" charset="-128"/>
+                <a:cs typeface="HGPSoeiKakugothicUB" charset="-128"/>
+              </a:rPr>
+              <a:t>2</a:t>
+            </a:r>
+          </a:p>
+        </p:txBody>
+      </p:sp>
+      <p:sp>
+        <p:nvSpPr>
+          <p:cNvPr id="50" name="角丸四角形 49"/>
+          <p:cNvSpPr/>
+          <p:nvPr/>
+        </p:nvSpPr>
+        <p:spPr>
+          <a:xfrm>
+            <a:off x="4495310" y="1981286"/>
+            <a:ext cx="923627" cy="1565955"/>
+          </a:xfrm>
+          <a:prstGeom prst="roundRect">
+            <a:avLst/>
+          </a:prstGeom>
+        </p:spPr>
+        <p:style>
+          <a:lnRef idx="2">
+            <a:schemeClr val="accent1">
+              <a:shade val="50000"/>
+            </a:schemeClr>
+          </a:lnRef>
+          <a:fillRef idx="1">
+            <a:schemeClr val="accent1"/>
+          </a:fillRef>
+          <a:effectRef idx="0">
+            <a:schemeClr val="accent1"/>
+          </a:effectRef>
+          <a:fontRef idx="minor">
+            <a:schemeClr val="lt1"/>
+          </a:fontRef>
+        </p:style>
+        <p:txBody>
+          <a:bodyPr rtlCol="0" anchor="ctr"/>
+          <a:lstStyle/>
+          <a:p>
+            <a:pPr algn="ctr"/>
+            <a:endParaRPr kumimoji="1" lang="ja-JP" altLang="en-US"/>
+          </a:p>
+        </p:txBody>
+      </p:sp>
+      <p:sp>
+        <p:nvSpPr>
+          <p:cNvPr id="51" name="正方形/長方形 50"/>
+          <p:cNvSpPr/>
+          <p:nvPr/>
+        </p:nvSpPr>
+        <p:spPr>
+          <a:xfrm>
+            <a:off x="3603904" y="2289063"/>
+            <a:ext cx="609600" cy="418170"/>
+          </a:xfrm>
+          <a:prstGeom prst="rect">
+            <a:avLst/>
+          </a:prstGeom>
+        </p:spPr>
+        <p:style>
+          <a:lnRef idx="2">
+            <a:schemeClr val="accent2">
+              <a:shade val="50000"/>
+            </a:schemeClr>
+          </a:lnRef>
+          <a:fillRef idx="1">
+            <a:schemeClr val="accent2"/>
+          </a:fillRef>
+          <a:effectRef idx="0">
+            <a:schemeClr val="accent2"/>
+          </a:effectRef>
+          <a:fontRef idx="minor">
+            <a:schemeClr val="lt1"/>
+          </a:fontRef>
+        </p:style>
+        <p:txBody>
+          <a:bodyPr rtlCol="0" anchor="ctr"/>
+          <a:lstStyle/>
+          <a:p>
+            <a:pPr algn="ctr"/>
+            <a:endParaRPr kumimoji="1" lang="ja-JP" altLang="en-US"/>
+          </a:p>
+        </p:txBody>
+      </p:sp>
+      <p:sp>
+        <p:nvSpPr>
+          <p:cNvPr id="52" name="テキスト ボックス 51"/>
+          <p:cNvSpPr txBox="1"/>
+          <p:nvPr/>
+        </p:nvSpPr>
+        <p:spPr>
+          <a:xfrm>
+            <a:off x="3455093" y="2000217"/>
+            <a:ext cx="930063" cy="276999"/>
+          </a:xfrm>
+          <a:prstGeom prst="rect">
+            <a:avLst/>
+          </a:prstGeom>
+          <a:noFill/>
+        </p:spPr>
+        <p:txBody>
+          <a:bodyPr wrap="none" rtlCol="0">
+            <a:spAutoFit/>
+          </a:bodyPr>
+          <a:lstStyle/>
+          <a:p>
+            <a:r>
+              <a:rPr kumimoji="1" lang="ja-JP" altLang="en-US" sz="1200" dirty="0" smtClean="0">
+                <a:latin typeface="HGPSoeiKakugothicUB" charset="-128"/>
+                <a:ea typeface="HGPSoeiKakugothicUB" charset="-128"/>
+                <a:cs typeface="HGPSoeiKakugothicUB" charset="-128"/>
+              </a:rPr>
+              <a:t>デバイス</a:t>
+            </a:r>
+            <a:r>
+              <a:rPr kumimoji="1" lang="en-US" altLang="ja-JP" sz="1200" dirty="0" smtClean="0">
+                <a:latin typeface="HGPSoeiKakugothicUB" charset="-128"/>
+                <a:ea typeface="HGPSoeiKakugothicUB" charset="-128"/>
+                <a:cs typeface="HGPSoeiKakugothicUB" charset="-128"/>
+              </a:rPr>
+              <a:t> D</a:t>
+            </a:r>
+            <a:r>
+              <a:rPr kumimoji="1" lang="en-US" altLang="ja-JP" sz="1200" baseline="-25000" dirty="0" smtClean="0">
+                <a:latin typeface="HGPSoeiKakugothicUB" charset="-128"/>
+                <a:ea typeface="HGPSoeiKakugothicUB" charset="-128"/>
+                <a:cs typeface="HGPSoeiKakugothicUB" charset="-128"/>
+              </a:rPr>
+              <a:t>1</a:t>
+            </a:r>
+          </a:p>
+        </p:txBody>
+      </p:sp>
+      <p:sp>
+        <p:nvSpPr>
+          <p:cNvPr id="57" name="テキスト ボックス 56"/>
+          <p:cNvSpPr txBox="1"/>
+          <p:nvPr/>
+        </p:nvSpPr>
+        <p:spPr>
+          <a:xfrm>
+            <a:off x="4478612" y="1997864"/>
+            <a:ext cx="930063" cy="276999"/>
+          </a:xfrm>
+          <a:prstGeom prst="rect">
+            <a:avLst/>
+          </a:prstGeom>
+          <a:noFill/>
+        </p:spPr>
+        <p:txBody>
+          <a:bodyPr wrap="none" rtlCol="0">
+            <a:spAutoFit/>
+          </a:bodyPr>
+          <a:lstStyle/>
+          <a:p>
+            <a:r>
+              <a:rPr kumimoji="1" lang="ja-JP" altLang="en-US" sz="1200" dirty="0" smtClean="0">
+                <a:latin typeface="HGPSoeiKakugothicUB" charset="-128"/>
+                <a:ea typeface="HGPSoeiKakugothicUB" charset="-128"/>
+                <a:cs typeface="HGPSoeiKakugothicUB" charset="-128"/>
+              </a:rPr>
+              <a:t>デバイス</a:t>
+            </a:r>
+            <a:r>
+              <a:rPr kumimoji="1" lang="en-US" altLang="ja-JP" sz="1200" dirty="0" smtClean="0">
+                <a:latin typeface="HGPSoeiKakugothicUB" charset="-128"/>
+                <a:ea typeface="HGPSoeiKakugothicUB" charset="-128"/>
+                <a:cs typeface="HGPSoeiKakugothicUB" charset="-128"/>
+              </a:rPr>
+              <a:t> D</a:t>
+            </a:r>
+            <a:r>
+              <a:rPr lang="en-US" altLang="ja-JP" sz="1200" baseline="-25000" dirty="0">
+                <a:latin typeface="HGPSoeiKakugothicUB" charset="-128"/>
+                <a:ea typeface="HGPSoeiKakugothicUB" charset="-128"/>
+                <a:cs typeface="HGPSoeiKakugothicUB" charset="-128"/>
+              </a:rPr>
+              <a:t>2</a:t>
+            </a:r>
+            <a:endParaRPr kumimoji="1" lang="en-US" altLang="ja-JP" sz="1200" baseline="-25000" dirty="0" smtClean="0">
+              <a:latin typeface="HGPSoeiKakugothicUB" charset="-128"/>
+              <a:ea typeface="HGPSoeiKakugothicUB" charset="-128"/>
+              <a:cs typeface="HGPSoeiKakugothicUB" charset="-128"/>
+            </a:endParaRPr>
+          </a:p>
+        </p:txBody>
+      </p:sp>
+      <p:sp>
+        <p:nvSpPr>
+          <p:cNvPr id="62" name="テキスト ボックス 61"/>
+          <p:cNvSpPr txBox="1"/>
+          <p:nvPr/>
+        </p:nvSpPr>
+        <p:spPr>
+          <a:xfrm>
+            <a:off x="4478612" y="2667723"/>
+            <a:ext cx="962123" cy="276999"/>
+          </a:xfrm>
+          <a:prstGeom prst="rect">
+            <a:avLst/>
+          </a:prstGeom>
+          <a:noFill/>
+        </p:spPr>
+        <p:txBody>
+          <a:bodyPr wrap="none" rtlCol="0">
+            <a:spAutoFit/>
+          </a:bodyPr>
+          <a:lstStyle/>
+          <a:p>
+            <a:r>
+              <a:rPr kumimoji="1" lang="ja-JP" altLang="en-US" sz="1200" dirty="0" smtClean="0">
+                <a:latin typeface="HGPSoeiKakugothicUB" charset="-128"/>
+                <a:ea typeface="HGPSoeiKakugothicUB" charset="-128"/>
+                <a:cs typeface="HGPSoeiKakugothicUB" charset="-128"/>
+              </a:rPr>
+              <a:t>デバイス</a:t>
+            </a:r>
+            <a:r>
+              <a:rPr kumimoji="1" lang="en-US" altLang="ja-JP" sz="1200" dirty="0" smtClean="0">
+                <a:latin typeface="HGPSoeiKakugothicUB" charset="-128"/>
+                <a:ea typeface="HGPSoeiKakugothicUB" charset="-128"/>
+                <a:cs typeface="HGPSoeiKakugothicUB" charset="-128"/>
+              </a:rPr>
+              <a:t> D</a:t>
+            </a:r>
+            <a:r>
+              <a:rPr kumimoji="1" lang="en-US" altLang="ja-JP" sz="1200" baseline="-25000" dirty="0" smtClean="0">
+                <a:latin typeface="HGPSoeiKakugothicUB" charset="-128"/>
+                <a:ea typeface="HGPSoeiKakugothicUB" charset="-128"/>
+                <a:cs typeface="HGPSoeiKakugothicUB" charset="-128"/>
+              </a:rPr>
+              <a:t>3</a:t>
+            </a:r>
+          </a:p>
+        </p:txBody>
+      </p:sp>
+      <p:sp>
+        <p:nvSpPr>
+          <p:cNvPr id="63" name="正方形/長方形 62"/>
+          <p:cNvSpPr/>
+          <p:nvPr/>
+        </p:nvSpPr>
+        <p:spPr>
+          <a:xfrm>
+            <a:off x="4606613" y="2246134"/>
+            <a:ext cx="609600" cy="448948"/>
+          </a:xfrm>
+          <a:prstGeom prst="rect">
+            <a:avLst/>
+          </a:prstGeom>
+        </p:spPr>
+        <p:style>
+          <a:lnRef idx="2">
+            <a:schemeClr val="accent2">
+              <a:shade val="50000"/>
+            </a:schemeClr>
+          </a:lnRef>
+          <a:fillRef idx="1">
+            <a:schemeClr val="accent2"/>
+          </a:fillRef>
+          <a:effectRef idx="0">
+            <a:schemeClr val="accent2"/>
+          </a:effectRef>
+          <a:fontRef idx="minor">
+            <a:schemeClr val="lt1"/>
+          </a:fontRef>
+        </p:style>
+        <p:txBody>
+          <a:bodyPr rtlCol="0" anchor="ctr"/>
+          <a:lstStyle/>
+          <a:p>
+            <a:pPr algn="ctr"/>
+            <a:endParaRPr kumimoji="1" lang="ja-JP" altLang="en-US"/>
+          </a:p>
+        </p:txBody>
+      </p:sp>
+      <p:sp>
+        <p:nvSpPr>
+          <p:cNvPr id="65" name="正方形/長方形 64"/>
+          <p:cNvSpPr/>
+          <p:nvPr/>
+        </p:nvSpPr>
+        <p:spPr>
+          <a:xfrm>
+            <a:off x="4606613" y="2915208"/>
+            <a:ext cx="609600" cy="470922"/>
+          </a:xfrm>
+          <a:prstGeom prst="rect">
+            <a:avLst/>
+          </a:prstGeom>
+        </p:spPr>
+        <p:style>
+          <a:lnRef idx="2">
+            <a:schemeClr val="accent2">
+              <a:shade val="50000"/>
+            </a:schemeClr>
+          </a:lnRef>
+          <a:fillRef idx="1">
+            <a:schemeClr val="accent2"/>
+          </a:fillRef>
+          <a:effectRef idx="0">
+            <a:schemeClr val="accent2"/>
+          </a:effectRef>
+          <a:fontRef idx="minor">
+            <a:schemeClr val="lt1"/>
+          </a:fontRef>
+        </p:style>
+        <p:txBody>
+          <a:bodyPr rtlCol="0" anchor="ctr"/>
+          <a:lstStyle/>
+          <a:p>
+            <a:pPr algn="ctr"/>
+            <a:endParaRPr kumimoji="1" lang="ja-JP" altLang="en-US"/>
+          </a:p>
+        </p:txBody>
+      </p:sp>
+      <p:cxnSp>
+        <p:nvCxnSpPr>
+          <p:cNvPr id="70" name="直線矢印コネクタ 69"/>
+          <p:cNvCxnSpPr>
+            <a:stCxn id="28" idx="3"/>
+            <a:endCxn id="51" idx="1"/>
+          </p:cNvCxnSpPr>
+          <p:nvPr/>
+        </p:nvCxnSpPr>
+        <p:spPr>
+          <a:xfrm flipV="1">
+            <a:off x="2560730" y="2498148"/>
+            <a:ext cx="1043174" cy="1933078"/>
+          </a:xfrm>
+          <a:prstGeom prst="straightConnector1">
+            <a:avLst/>
+          </a:prstGeom>
+          <a:ln>
+            <a:solidFill>
+              <a:schemeClr val="tx1"/>
+            </a:solidFill>
+            <a:headEnd type="none" w="med" len="med"/>
+            <a:tailEnd type="arrow" w="med" len="med"/>
+          </a:ln>
+        </p:spPr>
+        <p:style>
+          <a:lnRef idx="1">
+            <a:schemeClr val="accent1"/>
+          </a:lnRef>
+          <a:fillRef idx="0">
+            <a:schemeClr val="accent1"/>
+          </a:fillRef>
+          <a:effectRef idx="0">
+            <a:schemeClr val="accent1"/>
+          </a:effectRef>
+          <a:fontRef idx="minor">
+            <a:schemeClr val="tx1"/>
+          </a:fontRef>
+        </p:style>
+      </p:cxnSp>
+      <p:cxnSp>
+        <p:nvCxnSpPr>
+          <p:cNvPr id="71" name="直線矢印コネクタ 70"/>
+          <p:cNvCxnSpPr>
+            <a:stCxn id="41" idx="3"/>
+            <a:endCxn id="63" idx="1"/>
+          </p:cNvCxnSpPr>
+          <p:nvPr/>
+        </p:nvCxnSpPr>
+        <p:spPr>
+          <a:xfrm flipV="1">
+            <a:off x="3563439" y="2470608"/>
+            <a:ext cx="1043174" cy="1945229"/>
+          </a:xfrm>
+          <a:prstGeom prst="straightConnector1">
+            <a:avLst/>
+          </a:prstGeom>
+          <a:ln>
+            <a:solidFill>
+              <a:schemeClr val="tx1"/>
+            </a:solidFill>
+            <a:headEnd type="none" w="med" len="med"/>
+            <a:tailEnd type="arrow" w="med" len="med"/>
+          </a:ln>
+        </p:spPr>
+        <p:style>
+          <a:lnRef idx="1">
+            <a:schemeClr val="accent1"/>
+          </a:lnRef>
+          <a:fillRef idx="0">
+            <a:schemeClr val="accent1"/>
+          </a:fillRef>
+          <a:effectRef idx="0">
+            <a:schemeClr val="accent1"/>
+          </a:effectRef>
+          <a:fontRef idx="minor">
+            <a:schemeClr val="tx1"/>
+          </a:fontRef>
+        </p:style>
+      </p:cxnSp>
+      <p:cxnSp>
+        <p:nvCxnSpPr>
+          <p:cNvPr id="74" name="直線矢印コネクタ 73"/>
+          <p:cNvCxnSpPr>
+            <a:stCxn id="43" idx="3"/>
+            <a:endCxn id="65" idx="1"/>
+          </p:cNvCxnSpPr>
+          <p:nvPr/>
+        </p:nvCxnSpPr>
+        <p:spPr>
+          <a:xfrm flipV="1">
+            <a:off x="3563439" y="3150669"/>
+            <a:ext cx="1043174" cy="1933078"/>
+          </a:xfrm>
+          <a:prstGeom prst="straightConnector1">
+            <a:avLst/>
+          </a:prstGeom>
+          <a:ln>
+            <a:solidFill>
+              <a:schemeClr val="tx1"/>
+            </a:solidFill>
+            <a:headEnd type="none" w="med" len="med"/>
+            <a:tailEnd type="arrow" w="med" len="med"/>
+          </a:ln>
+        </p:spPr>
+        <p:style>
+          <a:lnRef idx="1">
+            <a:schemeClr val="accent1"/>
+          </a:lnRef>
+          <a:fillRef idx="0">
+            <a:schemeClr val="accent1"/>
+          </a:fillRef>
+          <a:effectRef idx="0">
+            <a:schemeClr val="accent1"/>
+          </a:effectRef>
+          <a:fontRef idx="minor">
+            <a:schemeClr val="tx1"/>
+          </a:fontRef>
+        </p:style>
+      </p:cxnSp>
+      <p:sp>
+        <p:nvSpPr>
+          <p:cNvPr id="80" name="正方形/長方形 79"/>
+          <p:cNvSpPr/>
+          <p:nvPr/>
+        </p:nvSpPr>
+        <p:spPr>
+          <a:xfrm>
+            <a:off x="7609487" y="2214465"/>
+            <a:ext cx="644934" cy="512286"/>
+          </a:xfrm>
+          <a:prstGeom prst="rect">
+            <a:avLst/>
+          </a:prstGeom>
+        </p:spPr>
+        <p:style>
+          <a:lnRef idx="2">
+            <a:schemeClr val="accent6">
+              <a:shade val="50000"/>
+            </a:schemeClr>
+          </a:lnRef>
+          <a:fillRef idx="1">
+            <a:schemeClr val="accent6"/>
+          </a:fillRef>
+          <a:effectRef idx="0">
+            <a:schemeClr val="accent6"/>
+          </a:effectRef>
+          <a:fontRef idx="minor">
+            <a:schemeClr val="lt1"/>
+          </a:fontRef>
+        </p:style>
+        <p:txBody>
+          <a:bodyPr rtlCol="0" anchor="ctr"/>
+          <a:lstStyle/>
+          <a:p>
+            <a:pPr algn="ctr"/>
+            <a:endParaRPr kumimoji="1" lang="ja-JP" altLang="en-US"/>
+          </a:p>
+        </p:txBody>
+      </p:sp>
+      <p:sp>
+        <p:nvSpPr>
+          <p:cNvPr id="81" name="テキスト ボックス 80"/>
+          <p:cNvSpPr txBox="1"/>
+          <p:nvPr/>
+        </p:nvSpPr>
+        <p:spPr>
+          <a:xfrm>
+            <a:off x="7581476" y="1930553"/>
+            <a:ext cx="772969" cy="276999"/>
+          </a:xfrm>
+          <a:prstGeom prst="rect">
+            <a:avLst/>
+          </a:prstGeom>
+          <a:noFill/>
+        </p:spPr>
+        <p:txBody>
+          <a:bodyPr wrap="none" rtlCol="0">
+            <a:spAutoFit/>
+          </a:bodyPr>
+          <a:lstStyle/>
+          <a:p>
+            <a:r>
+              <a:rPr kumimoji="1" lang="ja-JP" altLang="en-US" sz="1200" dirty="0" smtClean="0">
+                <a:latin typeface="HGPSoeiKakugothicUB" charset="-128"/>
+                <a:ea typeface="HGPSoeiKakugothicUB" charset="-128"/>
+                <a:cs typeface="HGPSoeiKakugothicUB" charset="-128"/>
+              </a:rPr>
+              <a:t>レシピ</a:t>
+            </a:r>
+            <a:r>
+              <a:rPr kumimoji="1" lang="en-US" altLang="ja-JP" sz="1200" dirty="0" smtClean="0">
+                <a:latin typeface="HGPSoeiKakugothicUB" charset="-128"/>
+                <a:ea typeface="HGPSoeiKakugothicUB" charset="-128"/>
+                <a:cs typeface="HGPSoeiKakugothicUB" charset="-128"/>
+              </a:rPr>
+              <a:t> R</a:t>
+            </a:r>
+            <a:r>
+              <a:rPr kumimoji="1" lang="en-US" altLang="ja-JP" sz="1200" baseline="-25000" dirty="0" smtClean="0">
+                <a:latin typeface="HGPSoeiKakugothicUB" charset="-128"/>
+                <a:ea typeface="HGPSoeiKakugothicUB" charset="-128"/>
+                <a:cs typeface="HGPSoeiKakugothicUB" charset="-128"/>
+              </a:rPr>
+              <a:t>1</a:t>
+            </a:r>
+          </a:p>
+        </p:txBody>
+      </p:sp>
+      <p:grpSp>
+        <p:nvGrpSpPr>
+          <p:cNvPr id="82" name="図形グループ 81"/>
+          <p:cNvGrpSpPr/>
+          <p:nvPr/>
+        </p:nvGrpSpPr>
+        <p:grpSpPr>
+          <a:xfrm>
+            <a:off x="9483548" y="3062280"/>
+            <a:ext cx="292100" cy="647700"/>
+            <a:chOff x="5181600" y="3937000"/>
+            <a:chExt cx="292100" cy="647700"/>
+          </a:xfrm>
+        </p:grpSpPr>
+        <p:sp>
+          <p:nvSpPr>
+            <p:cNvPr id="83" name="円/楕円 82"/>
+            <p:cNvSpPr/>
+            <p:nvPr/>
+          </p:nvSpPr>
+          <p:spPr>
+            <a:xfrm>
+              <a:off x="5181600" y="3937000"/>
+              <a:ext cx="292100" cy="292100"/>
+            </a:xfrm>
+            <a:prstGeom prst="ellipse">
+              <a:avLst/>
+            </a:prstGeom>
+          </p:spPr>
+          <p:style>
+            <a:lnRef idx="2">
+              <a:schemeClr val="accent6">
+                <a:shade val="50000"/>
+              </a:schemeClr>
+            </a:lnRef>
+            <a:fillRef idx="1">
+              <a:schemeClr val="accent6"/>
+            </a:fillRef>
+            <a:effectRef idx="0">
+              <a:schemeClr val="accent6"/>
+            </a:effectRef>
+            <a:fontRef idx="minor">
+              <a:schemeClr val="lt1"/>
+            </a:fontRef>
+          </p:style>
+          <p:txBody>
+            <a:bodyPr rtlCol="0" anchor="ctr"/>
+            <a:lstStyle/>
+            <a:p>
+              <a:pPr algn="ctr"/>
+              <a:endParaRPr kumimoji="1" lang="ja-JP" altLang="en-US"/>
+            </a:p>
+          </p:txBody>
+        </p:sp>
+        <p:cxnSp>
+          <p:nvCxnSpPr>
+            <p:cNvPr id="84" name="直線コネクタ 83"/>
+            <p:cNvCxnSpPr/>
+            <p:nvPr/>
+          </p:nvCxnSpPr>
+          <p:spPr>
+            <a:xfrm>
+              <a:off x="5327650" y="4229100"/>
+              <a:ext cx="0" cy="241300"/>
+            </a:xfrm>
+            <a:prstGeom prst="line">
+              <a:avLst/>
+            </a:prstGeom>
+            <a:ln w="38100">
+              <a:solidFill>
+                <a:schemeClr val="accent6"/>
+              </a:solidFill>
+            </a:ln>
+          </p:spPr>
+          <p:style>
+            <a:lnRef idx="1">
+              <a:schemeClr val="accent1"/>
+            </a:lnRef>
+            <a:fillRef idx="0">
+              <a:schemeClr val="accent1"/>
+            </a:fillRef>
+            <a:effectRef idx="0">
+              <a:schemeClr val="accent1"/>
+            </a:effectRef>
+            <a:fontRef idx="minor">
+              <a:schemeClr val="tx1"/>
+            </a:fontRef>
+          </p:style>
+        </p:cxnSp>
+        <p:cxnSp>
+          <p:nvCxnSpPr>
+            <p:cNvPr id="85" name="直線コネクタ 84"/>
+            <p:cNvCxnSpPr/>
+            <p:nvPr/>
+          </p:nvCxnSpPr>
+          <p:spPr>
+            <a:xfrm>
+              <a:off x="5327650" y="4470400"/>
+              <a:ext cx="117475" cy="114300"/>
+            </a:xfrm>
+            <a:prstGeom prst="line">
+              <a:avLst/>
+            </a:prstGeom>
+            <a:ln w="38100">
+              <a:solidFill>
+                <a:schemeClr val="accent6"/>
+              </a:solidFill>
+            </a:ln>
+          </p:spPr>
+          <p:style>
+            <a:lnRef idx="1">
+              <a:schemeClr val="accent1"/>
+            </a:lnRef>
+            <a:fillRef idx="0">
+              <a:schemeClr val="accent1"/>
+            </a:fillRef>
+            <a:effectRef idx="0">
+              <a:schemeClr val="accent1"/>
+            </a:effectRef>
+            <a:fontRef idx="minor">
+              <a:schemeClr val="tx1"/>
+            </a:fontRef>
+          </p:style>
+        </p:cxnSp>
+        <p:cxnSp>
+          <p:nvCxnSpPr>
+            <p:cNvPr id="86" name="直線コネクタ 85"/>
+            <p:cNvCxnSpPr/>
+            <p:nvPr/>
+          </p:nvCxnSpPr>
+          <p:spPr>
+            <a:xfrm flipH="1">
+              <a:off x="5210175" y="4470400"/>
+              <a:ext cx="117475" cy="114300"/>
+            </a:xfrm>
+            <a:prstGeom prst="line">
+              <a:avLst/>
+            </a:prstGeom>
+            <a:ln w="38100">
+              <a:solidFill>
+                <a:schemeClr val="accent6"/>
+              </a:solidFill>
+            </a:ln>
+          </p:spPr>
+          <p:style>
+            <a:lnRef idx="1">
+              <a:schemeClr val="accent1"/>
+            </a:lnRef>
+            <a:fillRef idx="0">
+              <a:schemeClr val="accent1"/>
+            </a:fillRef>
+            <a:effectRef idx="0">
+              <a:schemeClr val="accent1"/>
+            </a:effectRef>
+            <a:fontRef idx="minor">
+              <a:schemeClr val="tx1"/>
+            </a:fontRef>
+          </p:style>
+        </p:cxnSp>
+        <p:cxnSp>
+          <p:nvCxnSpPr>
+            <p:cNvPr id="87" name="直線コネクタ 86"/>
+            <p:cNvCxnSpPr/>
+            <p:nvPr/>
+          </p:nvCxnSpPr>
+          <p:spPr>
+            <a:xfrm>
+              <a:off x="5327650" y="4292600"/>
+              <a:ext cx="117475" cy="114300"/>
+            </a:xfrm>
+            <a:prstGeom prst="line">
+              <a:avLst/>
+            </a:prstGeom>
+            <a:ln w="38100">
+              <a:solidFill>
+                <a:schemeClr val="accent6"/>
+              </a:solidFill>
+            </a:ln>
+          </p:spPr>
+          <p:style>
+            <a:lnRef idx="1">
+              <a:schemeClr val="accent1"/>
+            </a:lnRef>
+            <a:fillRef idx="0">
+              <a:schemeClr val="accent1"/>
+            </a:fillRef>
+            <a:effectRef idx="0">
+              <a:schemeClr val="accent1"/>
+            </a:effectRef>
+            <a:fontRef idx="minor">
+              <a:schemeClr val="tx1"/>
+            </a:fontRef>
+          </p:style>
+        </p:cxnSp>
+        <p:cxnSp>
+          <p:nvCxnSpPr>
+            <p:cNvPr id="88" name="直線コネクタ 87"/>
+            <p:cNvCxnSpPr/>
+            <p:nvPr/>
+          </p:nvCxnSpPr>
+          <p:spPr>
+            <a:xfrm flipH="1">
+              <a:off x="5210175" y="4292600"/>
+              <a:ext cx="117475" cy="114300"/>
+            </a:xfrm>
+            <a:prstGeom prst="line">
+              <a:avLst/>
+            </a:prstGeom>
+            <a:ln w="38100">
+              <a:solidFill>
+                <a:schemeClr val="accent6"/>
+              </a:solidFill>
+            </a:ln>
+          </p:spPr>
+          <p:style>
+            <a:lnRef idx="1">
+              <a:schemeClr val="accent1"/>
+            </a:lnRef>
+            <a:fillRef idx="0">
+              <a:schemeClr val="accent1"/>
+            </a:fillRef>
+            <a:effectRef idx="0">
+              <a:schemeClr val="accent1"/>
+            </a:effectRef>
+            <a:fontRef idx="minor">
+              <a:schemeClr val="tx1"/>
+            </a:fontRef>
+          </p:style>
+        </p:cxnSp>
+      </p:grpSp>
+      <p:sp>
+        <p:nvSpPr>
+          <p:cNvPr id="89" name="テキスト ボックス 88"/>
+          <p:cNvSpPr txBox="1"/>
+          <p:nvPr/>
+        </p:nvSpPr>
+        <p:spPr>
+          <a:xfrm>
+            <a:off x="9208036" y="2600615"/>
+            <a:ext cx="1013419" cy="461665"/>
+          </a:xfrm>
+          <a:prstGeom prst="rect">
+            <a:avLst/>
+          </a:prstGeom>
+          <a:noFill/>
+        </p:spPr>
+        <p:txBody>
+          <a:bodyPr wrap="none" rtlCol="0">
+            <a:spAutoFit/>
+          </a:bodyPr>
+          <a:lstStyle/>
+          <a:p>
+            <a:r>
+              <a:rPr kumimoji="1" lang="ja-JP" altLang="en-US" sz="1200" dirty="0" smtClean="0">
+                <a:latin typeface="HGPSoeiKakugothicUB" charset="-128"/>
+                <a:ea typeface="HGPSoeiKakugothicUB" charset="-128"/>
+                <a:cs typeface="HGPSoeiKakugothicUB" charset="-128"/>
+              </a:rPr>
+              <a:t>レストラン</a:t>
+            </a:r>
+            <a:endParaRPr kumimoji="1" lang="en-US" altLang="ja-JP" sz="1200" dirty="0" smtClean="0">
+              <a:latin typeface="HGPSoeiKakugothicUB" charset="-128"/>
+              <a:ea typeface="HGPSoeiKakugothicUB" charset="-128"/>
+              <a:cs typeface="HGPSoeiKakugothicUB" charset="-128"/>
+            </a:endParaRPr>
+          </a:p>
+          <a:p>
+            <a:r>
+              <a:rPr lang="ja-JP" altLang="en-US" sz="1200" dirty="0" smtClean="0">
+                <a:latin typeface="HGPSoeiKakugothicUB" charset="-128"/>
+                <a:ea typeface="HGPSoeiKakugothicUB" charset="-128"/>
+                <a:cs typeface="HGPSoeiKakugothicUB" charset="-128"/>
+              </a:rPr>
+              <a:t>オーナー</a:t>
+            </a:r>
+            <a:r>
+              <a:rPr kumimoji="1" lang="en-US" altLang="ja-JP" sz="1200" dirty="0" smtClean="0">
+                <a:latin typeface="HGPSoeiKakugothicUB" charset="-128"/>
+                <a:ea typeface="HGPSoeiKakugothicUB" charset="-128"/>
+                <a:cs typeface="HGPSoeiKakugothicUB" charset="-128"/>
+              </a:rPr>
+              <a:t> RO</a:t>
+            </a:r>
+            <a:r>
+              <a:rPr kumimoji="1" lang="en-US" altLang="ja-JP" sz="1200" baseline="-25000" dirty="0" smtClean="0">
+                <a:latin typeface="HGPSoeiKakugothicUB" charset="-128"/>
+                <a:ea typeface="HGPSoeiKakugothicUB" charset="-128"/>
+                <a:cs typeface="HGPSoeiKakugothicUB" charset="-128"/>
+              </a:rPr>
+              <a:t>1</a:t>
+            </a:r>
+            <a:endParaRPr kumimoji="1" lang="ja-JP" altLang="en-US" sz="1200" baseline="-25000" dirty="0">
+              <a:latin typeface="HGPSoeiKakugothicUB" charset="-128"/>
+              <a:ea typeface="HGPSoeiKakugothicUB" charset="-128"/>
+              <a:cs typeface="HGPSoeiKakugothicUB" charset="-128"/>
+            </a:endParaRPr>
+          </a:p>
+        </p:txBody>
+      </p:sp>
+      <p:cxnSp>
+        <p:nvCxnSpPr>
+          <p:cNvPr id="92" name="直線矢印コネクタ 91"/>
+          <p:cNvCxnSpPr>
+            <a:stCxn id="63" idx="3"/>
+          </p:cNvCxnSpPr>
+          <p:nvPr/>
+        </p:nvCxnSpPr>
+        <p:spPr>
+          <a:xfrm>
+            <a:off x="5216213" y="2470608"/>
+            <a:ext cx="842667" cy="0"/>
+          </a:xfrm>
+          <a:prstGeom prst="straightConnector1">
+            <a:avLst/>
+          </a:prstGeom>
+          <a:ln>
+            <a:solidFill>
+              <a:schemeClr val="tx1"/>
+            </a:solidFill>
+            <a:headEnd type="none" w="med" len="med"/>
+            <a:tailEnd type="arrow" w="med" len="med"/>
+          </a:ln>
+        </p:spPr>
+        <p:style>
+          <a:lnRef idx="1">
+            <a:schemeClr val="accent1"/>
+          </a:lnRef>
+          <a:fillRef idx="0">
+            <a:schemeClr val="accent1"/>
+          </a:fillRef>
+          <a:effectRef idx="0">
+            <a:schemeClr val="accent1"/>
+          </a:effectRef>
+          <a:fontRef idx="minor">
+            <a:schemeClr val="tx1"/>
+          </a:fontRef>
+        </p:style>
+      </p:cxnSp>
+      <p:cxnSp>
+        <p:nvCxnSpPr>
+          <p:cNvPr id="95" name="直線矢印コネクタ 94"/>
+          <p:cNvCxnSpPr>
+            <a:stCxn id="80" idx="3"/>
+          </p:cNvCxnSpPr>
+          <p:nvPr/>
+        </p:nvCxnSpPr>
+        <p:spPr>
+          <a:xfrm>
+            <a:off x="8254421" y="2470608"/>
+            <a:ext cx="819553" cy="1340424"/>
+          </a:xfrm>
+          <a:prstGeom prst="straightConnector1">
+            <a:avLst/>
+          </a:prstGeom>
+          <a:ln>
+            <a:solidFill>
+              <a:schemeClr val="tx1"/>
+            </a:solidFill>
+            <a:headEnd type="none" w="med" len="med"/>
+            <a:tailEnd type="arrow" w="med" len="med"/>
+          </a:ln>
+        </p:spPr>
+        <p:style>
+          <a:lnRef idx="1">
+            <a:schemeClr val="accent1"/>
+          </a:lnRef>
+          <a:fillRef idx="0">
+            <a:schemeClr val="accent1"/>
+          </a:fillRef>
+          <a:effectRef idx="0">
+            <a:schemeClr val="accent1"/>
+          </a:effectRef>
+          <a:fontRef idx="minor">
+            <a:schemeClr val="tx1"/>
+          </a:fontRef>
+        </p:style>
+      </p:cxnSp>
+      <p:sp>
+        <p:nvSpPr>
+          <p:cNvPr id="99" name="テキスト ボックス 98"/>
+          <p:cNvSpPr txBox="1"/>
+          <p:nvPr/>
+        </p:nvSpPr>
+        <p:spPr>
+          <a:xfrm>
+            <a:off x="8884659" y="3849776"/>
+            <a:ext cx="903324" cy="369332"/>
+          </a:xfrm>
+          <a:prstGeom prst="rect">
+            <a:avLst/>
+          </a:prstGeom>
+          <a:noFill/>
+        </p:spPr>
+        <p:txBody>
+          <a:bodyPr wrap="square" rtlCol="0">
+            <a:spAutoFit/>
+          </a:bodyPr>
+          <a:lstStyle/>
+          <a:p>
+            <a:r>
+              <a:rPr kumimoji="1" lang="ja-JP" altLang="en-US" smtClean="0"/>
+              <a:t>データ</a:t>
+            </a:r>
+            <a:endParaRPr kumimoji="1" lang="ja-JP" altLang="en-US" dirty="0"/>
+          </a:p>
+        </p:txBody>
+      </p:sp>
+      <p:cxnSp>
+        <p:nvCxnSpPr>
+          <p:cNvPr id="100" name="直線矢印コネクタ 99"/>
+          <p:cNvCxnSpPr>
+            <a:stCxn id="65" idx="3"/>
+          </p:cNvCxnSpPr>
+          <p:nvPr/>
+        </p:nvCxnSpPr>
+        <p:spPr>
+          <a:xfrm flipV="1">
+            <a:off x="5216213" y="2559323"/>
+            <a:ext cx="842667" cy="591346"/>
+          </a:xfrm>
+          <a:prstGeom prst="straightConnector1">
+            <a:avLst/>
+          </a:prstGeom>
+          <a:ln>
+            <a:solidFill>
+              <a:schemeClr val="tx1"/>
+            </a:solidFill>
+            <a:headEnd type="none" w="med" len="med"/>
+            <a:tailEnd type="arrow" w="med" len="med"/>
+          </a:ln>
+        </p:spPr>
+        <p:style>
+          <a:lnRef idx="1">
+            <a:schemeClr val="accent1"/>
+          </a:lnRef>
+          <a:fillRef idx="0">
+            <a:schemeClr val="accent1"/>
+          </a:fillRef>
+          <a:effectRef idx="0">
+            <a:schemeClr val="accent1"/>
+          </a:effectRef>
+          <a:fontRef idx="minor">
+            <a:schemeClr val="tx1"/>
+          </a:fontRef>
+        </p:style>
+      </p:cxnSp>
+      <p:sp>
+        <p:nvSpPr>
+          <p:cNvPr id="56" name="正方形/長方形 55"/>
+          <p:cNvSpPr/>
+          <p:nvPr/>
+        </p:nvSpPr>
+        <p:spPr>
+          <a:xfrm>
+            <a:off x="3803815" y="2969257"/>
+            <a:ext cx="211138" cy="163106"/>
+          </a:xfrm>
+          <a:prstGeom prst="rect">
+            <a:avLst/>
+          </a:prstGeom>
+        </p:spPr>
+        <p:style>
+          <a:lnRef idx="2">
+            <a:schemeClr val="accent4">
+              <a:shade val="50000"/>
+            </a:schemeClr>
+          </a:lnRef>
+          <a:fillRef idx="1">
+            <a:schemeClr val="accent4"/>
+          </a:fillRef>
+          <a:effectRef idx="0">
+            <a:schemeClr val="accent4"/>
+          </a:effectRef>
+          <a:fontRef idx="minor">
+            <a:schemeClr val="lt1"/>
+          </a:fontRef>
+        </p:style>
+        <p:txBody>
+          <a:bodyPr rtlCol="0" anchor="ctr"/>
+          <a:lstStyle/>
+          <a:p>
+            <a:pPr algn="ctr"/>
+            <a:endParaRPr kumimoji="1" lang="ja-JP" altLang="en-US"/>
+          </a:p>
+        </p:txBody>
+      </p:sp>
+      <p:sp>
+        <p:nvSpPr>
+          <p:cNvPr id="58" name="テキスト ボックス 57"/>
+          <p:cNvSpPr txBox="1"/>
+          <p:nvPr/>
+        </p:nvSpPr>
+        <p:spPr>
+          <a:xfrm>
+            <a:off x="3561380" y="3073807"/>
+            <a:ext cx="742511" cy="276999"/>
+          </a:xfrm>
+          <a:prstGeom prst="rect">
+            <a:avLst/>
+          </a:prstGeom>
+          <a:noFill/>
+        </p:spPr>
+        <p:txBody>
+          <a:bodyPr wrap="none" rtlCol="0">
+            <a:spAutoFit/>
+          </a:bodyPr>
+          <a:lstStyle/>
+          <a:p>
+            <a:r>
+              <a:rPr kumimoji="1" lang="ja-JP" altLang="en-US" sz="1200" dirty="0" smtClean="0">
+                <a:latin typeface="HGPSoeiKakugothicUB" charset="-128"/>
+                <a:ea typeface="HGPSoeiKakugothicUB" charset="-128"/>
+                <a:cs typeface="HGPSoeiKakugothicUB" charset="-128"/>
+              </a:rPr>
+              <a:t>センサ</a:t>
+            </a:r>
+            <a:r>
+              <a:rPr kumimoji="1" lang="en-US" altLang="ja-JP" sz="1200" dirty="0" smtClean="0">
+                <a:latin typeface="HGPSoeiKakugothicUB" charset="-128"/>
+                <a:ea typeface="HGPSoeiKakugothicUB" charset="-128"/>
+                <a:cs typeface="HGPSoeiKakugothicUB" charset="-128"/>
+              </a:rPr>
+              <a:t>S</a:t>
+            </a:r>
+            <a:r>
+              <a:rPr kumimoji="1" lang="en-US" altLang="ja-JP" sz="1200" baseline="-25000" dirty="0" smtClean="0">
+                <a:latin typeface="HGPSoeiKakugothicUB" charset="-128"/>
+                <a:ea typeface="HGPSoeiKakugothicUB" charset="-128"/>
+                <a:cs typeface="HGPSoeiKakugothicUB" charset="-128"/>
+              </a:rPr>
+              <a:t>2</a:t>
+            </a:r>
+          </a:p>
+        </p:txBody>
+      </p:sp>
+      <p:grpSp>
+        <p:nvGrpSpPr>
+          <p:cNvPr id="59" name="図形グループ 58"/>
+          <p:cNvGrpSpPr/>
+          <p:nvPr/>
+        </p:nvGrpSpPr>
+        <p:grpSpPr>
+          <a:xfrm rot="-2700000">
+            <a:off x="3686523" y="2781240"/>
+            <a:ext cx="445723" cy="445723"/>
+            <a:chOff x="4742656" y="4758033"/>
+            <a:chExt cx="1100138" cy="1100138"/>
+          </a:xfrm>
+        </p:grpSpPr>
+        <p:sp>
+          <p:nvSpPr>
+            <p:cNvPr id="60" name="円弧 59"/>
+            <p:cNvSpPr/>
+            <p:nvPr/>
+          </p:nvSpPr>
+          <p:spPr>
+            <a:xfrm>
+              <a:off x="5010150" y="5025527"/>
+              <a:ext cx="565150" cy="565150"/>
+            </a:xfrm>
+            <a:prstGeom prst="arc">
+              <a:avLst/>
+            </a:prstGeom>
+            <a:ln w="28575">
+              <a:solidFill>
+                <a:schemeClr val="tx1"/>
+              </a:solidFill>
+            </a:ln>
+          </p:spPr>
+          <p:style>
+            <a:lnRef idx="1">
+              <a:schemeClr val="accent1"/>
+            </a:lnRef>
+            <a:fillRef idx="0">
+              <a:schemeClr val="accent1"/>
+            </a:fillRef>
+            <a:effectRef idx="0">
+              <a:schemeClr val="accent1"/>
+            </a:effectRef>
+            <a:fontRef idx="minor">
+              <a:schemeClr val="tx1"/>
+            </a:fontRef>
+          </p:style>
+          <p:txBody>
+            <a:bodyPr rtlCol="0" anchor="ctr"/>
+            <a:lstStyle/>
+            <a:p>
+              <a:pPr algn="ctr"/>
+              <a:endParaRPr kumimoji="1" lang="ja-JP" altLang="en-US"/>
+            </a:p>
+          </p:txBody>
+        </p:sp>
+        <p:sp>
+          <p:nvSpPr>
+            <p:cNvPr id="61" name="円弧 60"/>
+            <p:cNvSpPr/>
+            <p:nvPr/>
+          </p:nvSpPr>
+          <p:spPr>
+            <a:xfrm>
+              <a:off x="4879975" y="4895352"/>
+              <a:ext cx="825500" cy="825500"/>
+            </a:xfrm>
+            <a:prstGeom prst="arc">
+              <a:avLst/>
+            </a:prstGeom>
+            <a:ln w="28575">
+              <a:solidFill>
+                <a:schemeClr val="tx1"/>
+              </a:solidFill>
+            </a:ln>
+          </p:spPr>
+          <p:style>
+            <a:lnRef idx="1">
+              <a:schemeClr val="accent1"/>
+            </a:lnRef>
+            <a:fillRef idx="0">
+              <a:schemeClr val="accent1"/>
+            </a:fillRef>
+            <a:effectRef idx="0">
+              <a:schemeClr val="accent1"/>
+            </a:effectRef>
+            <a:fontRef idx="minor">
+              <a:schemeClr val="tx1"/>
+            </a:fontRef>
+          </p:style>
+          <p:txBody>
+            <a:bodyPr rtlCol="0" anchor="ctr"/>
+            <a:lstStyle/>
+            <a:p>
+              <a:pPr algn="ctr"/>
+              <a:endParaRPr kumimoji="1" lang="ja-JP" altLang="en-US"/>
+            </a:p>
+          </p:txBody>
+        </p:sp>
+        <p:sp>
+          <p:nvSpPr>
+            <p:cNvPr id="64" name="円弧 63"/>
+            <p:cNvSpPr/>
+            <p:nvPr/>
+          </p:nvSpPr>
+          <p:spPr>
+            <a:xfrm>
+              <a:off x="4742656" y="4758033"/>
+              <a:ext cx="1100138" cy="1100138"/>
+            </a:xfrm>
+            <a:prstGeom prst="arc">
+              <a:avLst/>
+            </a:prstGeom>
+            <a:ln w="28575">
+              <a:solidFill>
+                <a:schemeClr val="tx1"/>
+              </a:solidFill>
+            </a:ln>
+          </p:spPr>
+          <p:style>
+            <a:lnRef idx="1">
+              <a:schemeClr val="accent1"/>
+            </a:lnRef>
+            <a:fillRef idx="0">
+              <a:schemeClr val="accent1"/>
+            </a:fillRef>
+            <a:effectRef idx="0">
+              <a:schemeClr val="accent1"/>
+            </a:effectRef>
+            <a:fontRef idx="minor">
+              <a:schemeClr val="tx1"/>
+            </a:fontRef>
+          </p:style>
+          <p:txBody>
+            <a:bodyPr rtlCol="0" anchor="ctr"/>
+            <a:lstStyle/>
+            <a:p>
+              <a:pPr algn="ctr"/>
+              <a:endParaRPr kumimoji="1" lang="ja-JP" altLang="en-US"/>
+            </a:p>
+          </p:txBody>
+        </p:sp>
+      </p:grpSp>
+      <p:sp>
+        <p:nvSpPr>
+          <p:cNvPr id="66" name="テキスト ボックス 65"/>
+          <p:cNvSpPr txBox="1"/>
+          <p:nvPr/>
+        </p:nvSpPr>
+        <p:spPr>
+          <a:xfrm>
+            <a:off x="4550051" y="2235749"/>
+            <a:ext cx="742511" cy="276999"/>
+          </a:xfrm>
+          <a:prstGeom prst="rect">
+            <a:avLst/>
+          </a:prstGeom>
+          <a:noFill/>
+        </p:spPr>
+        <p:txBody>
+          <a:bodyPr wrap="none" rtlCol="0">
+            <a:spAutoFit/>
+          </a:bodyPr>
+          <a:lstStyle/>
+          <a:p>
+            <a:r>
+              <a:rPr kumimoji="1" lang="ja-JP" altLang="en-US" sz="1200" dirty="0" smtClean="0">
+                <a:latin typeface="HGPSoeiKakugothicUB" charset="-128"/>
+                <a:ea typeface="HGPSoeiKakugothicUB" charset="-128"/>
+                <a:cs typeface="HGPSoeiKakugothicUB" charset="-128"/>
+              </a:rPr>
+              <a:t>センサ</a:t>
+            </a:r>
+            <a:r>
+              <a:rPr kumimoji="1" lang="en-US" altLang="ja-JP" sz="1200" dirty="0" smtClean="0">
+                <a:latin typeface="HGPSoeiKakugothicUB" charset="-128"/>
+                <a:ea typeface="HGPSoeiKakugothicUB" charset="-128"/>
+                <a:cs typeface="HGPSoeiKakugothicUB" charset="-128"/>
+              </a:rPr>
+              <a:t>S</a:t>
+            </a:r>
+            <a:r>
+              <a:rPr kumimoji="1" lang="en-US" altLang="ja-JP" sz="1200" baseline="-25000" dirty="0" smtClean="0">
+                <a:latin typeface="HGPSoeiKakugothicUB" charset="-128"/>
+                <a:ea typeface="HGPSoeiKakugothicUB" charset="-128"/>
+                <a:cs typeface="HGPSoeiKakugothicUB" charset="-128"/>
+              </a:rPr>
+              <a:t>3</a:t>
+            </a:r>
+          </a:p>
+        </p:txBody>
+      </p:sp>
+      <p:sp>
+        <p:nvSpPr>
+          <p:cNvPr id="67" name="テキスト ボックス 66"/>
+          <p:cNvSpPr txBox="1"/>
+          <p:nvPr/>
+        </p:nvSpPr>
+        <p:spPr>
+          <a:xfrm>
+            <a:off x="4551389" y="2915208"/>
+            <a:ext cx="742511" cy="276999"/>
+          </a:xfrm>
+          <a:prstGeom prst="rect">
+            <a:avLst/>
+          </a:prstGeom>
+          <a:noFill/>
+        </p:spPr>
+        <p:txBody>
+          <a:bodyPr wrap="none" rtlCol="0">
+            <a:spAutoFit/>
+          </a:bodyPr>
+          <a:lstStyle/>
+          <a:p>
+            <a:r>
+              <a:rPr kumimoji="1" lang="ja-JP" altLang="en-US" sz="1200" dirty="0" smtClean="0">
+                <a:latin typeface="HGPSoeiKakugothicUB" charset="-128"/>
+                <a:ea typeface="HGPSoeiKakugothicUB" charset="-128"/>
+                <a:cs typeface="HGPSoeiKakugothicUB" charset="-128"/>
+              </a:rPr>
+              <a:t>センサ</a:t>
+            </a:r>
+            <a:r>
+              <a:rPr kumimoji="1" lang="en-US" altLang="ja-JP" sz="1200" dirty="0" smtClean="0">
+                <a:latin typeface="HGPSoeiKakugothicUB" charset="-128"/>
+                <a:ea typeface="HGPSoeiKakugothicUB" charset="-128"/>
+                <a:cs typeface="HGPSoeiKakugothicUB" charset="-128"/>
+              </a:rPr>
+              <a:t>S</a:t>
+            </a:r>
+            <a:r>
+              <a:rPr kumimoji="1" lang="en-US" altLang="ja-JP" sz="1200" baseline="-25000" dirty="0" smtClean="0">
+                <a:latin typeface="HGPSoeiKakugothicUB" charset="-128"/>
+                <a:ea typeface="HGPSoeiKakugothicUB" charset="-128"/>
+                <a:cs typeface="HGPSoeiKakugothicUB" charset="-128"/>
+              </a:rPr>
+              <a:t>4</a:t>
+            </a:r>
+          </a:p>
+        </p:txBody>
+      </p:sp>
+      <p:sp>
+        <p:nvSpPr>
+          <p:cNvPr id="68" name="正方形/長方形 67"/>
+          <p:cNvSpPr/>
+          <p:nvPr/>
+        </p:nvSpPr>
+        <p:spPr>
+          <a:xfrm>
+            <a:off x="4787421" y="2486612"/>
+            <a:ext cx="211138" cy="163106"/>
+          </a:xfrm>
+          <a:prstGeom prst="rect">
+            <a:avLst/>
+          </a:prstGeom>
+        </p:spPr>
+        <p:style>
+          <a:lnRef idx="2">
+            <a:schemeClr val="accent4">
+              <a:shade val="50000"/>
+            </a:schemeClr>
+          </a:lnRef>
+          <a:fillRef idx="1">
+            <a:schemeClr val="accent4"/>
+          </a:fillRef>
+          <a:effectRef idx="0">
+            <a:schemeClr val="accent4"/>
+          </a:effectRef>
+          <a:fontRef idx="minor">
+            <a:schemeClr val="lt1"/>
+          </a:fontRef>
+        </p:style>
+        <p:txBody>
+          <a:bodyPr rtlCol="0" anchor="ctr"/>
+          <a:lstStyle/>
+          <a:p>
+            <a:pPr algn="ctr"/>
+            <a:endParaRPr kumimoji="1" lang="ja-JP" altLang="en-US"/>
+          </a:p>
+        </p:txBody>
+      </p:sp>
+      <p:sp>
+        <p:nvSpPr>
+          <p:cNvPr id="69" name="正方形/長方形 68"/>
+          <p:cNvSpPr/>
+          <p:nvPr/>
+        </p:nvSpPr>
+        <p:spPr>
+          <a:xfrm>
+            <a:off x="4787421" y="3167640"/>
+            <a:ext cx="211138" cy="163106"/>
+          </a:xfrm>
+          <a:prstGeom prst="rect">
+            <a:avLst/>
+          </a:prstGeom>
+        </p:spPr>
+        <p:style>
+          <a:lnRef idx="2">
+            <a:schemeClr val="accent4">
+              <a:shade val="50000"/>
+            </a:schemeClr>
+          </a:lnRef>
+          <a:fillRef idx="1">
+            <a:schemeClr val="accent4"/>
+          </a:fillRef>
+          <a:effectRef idx="0">
+            <a:schemeClr val="accent4"/>
+          </a:effectRef>
+          <a:fontRef idx="minor">
+            <a:schemeClr val="lt1"/>
+          </a:fontRef>
+        </p:style>
+        <p:txBody>
+          <a:bodyPr rtlCol="0" anchor="ctr"/>
+          <a:lstStyle/>
+          <a:p>
+            <a:pPr algn="ctr"/>
+            <a:endParaRPr kumimoji="1" lang="ja-JP" altLang="en-US"/>
+          </a:p>
+        </p:txBody>
+      </p:sp>
+      <p:sp>
+        <p:nvSpPr>
+          <p:cNvPr id="6" name="正方形/長方形 5"/>
+          <p:cNvSpPr/>
+          <p:nvPr/>
+        </p:nvSpPr>
+        <p:spPr>
+          <a:xfrm>
+            <a:off x="7217367" y="1719952"/>
+            <a:ext cx="1629199" cy="1901509"/>
+          </a:xfrm>
+          <a:prstGeom prst="rect">
+            <a:avLst/>
+          </a:prstGeom>
+          <a:noFill/>
+          <a:ln>
+            <a:solidFill>
+              <a:schemeClr val="tx1"/>
+            </a:solidFill>
+            <a:prstDash val="sysDash"/>
+          </a:ln>
+        </p:spPr>
+        <p:style>
+          <a:lnRef idx="2">
+            <a:schemeClr val="accent1">
+              <a:shade val="50000"/>
+            </a:schemeClr>
+          </a:lnRef>
+          <a:fillRef idx="1">
+            <a:schemeClr val="accent1"/>
+          </a:fillRef>
+          <a:effectRef idx="0">
+            <a:schemeClr val="accent1"/>
+          </a:effectRef>
+          <a:fontRef idx="minor">
+            <a:schemeClr val="lt1"/>
+          </a:fontRef>
+        </p:style>
+        <p:txBody>
+          <a:bodyPr rtlCol="0" anchor="ctr"/>
+          <a:lstStyle/>
+          <a:p>
+            <a:pPr algn="ctr"/>
+            <a:endParaRPr kumimoji="1" lang="ja-JP" altLang="en-US"/>
+          </a:p>
+        </p:txBody>
+      </p:sp>
+      <p:sp>
+        <p:nvSpPr>
+          <p:cNvPr id="72" name="テキスト ボックス 71"/>
+          <p:cNvSpPr txBox="1"/>
+          <p:nvPr/>
+        </p:nvSpPr>
+        <p:spPr>
+          <a:xfrm>
+            <a:off x="7134837" y="1425477"/>
+            <a:ext cx="949299" cy="276999"/>
+          </a:xfrm>
+          <a:prstGeom prst="rect">
+            <a:avLst/>
+          </a:prstGeom>
+          <a:noFill/>
+        </p:spPr>
+        <p:txBody>
+          <a:bodyPr wrap="none" rtlCol="0">
+            <a:spAutoFit/>
+          </a:bodyPr>
+          <a:lstStyle/>
+          <a:p>
+            <a:r>
+              <a:rPr kumimoji="1" lang="en-US" altLang="ja-JP" sz="1200" dirty="0" smtClean="0">
+                <a:latin typeface="HGPSoeiKakugothicUB" charset="-128"/>
+                <a:ea typeface="HGPSoeiKakugothicUB" charset="-128"/>
+                <a:cs typeface="HGPSoeiKakugothicUB" charset="-128"/>
+              </a:rPr>
+              <a:t>RO</a:t>
+            </a:r>
+            <a:r>
+              <a:rPr kumimoji="1" lang="en-US" altLang="ja-JP" sz="1200" baseline="-25000" dirty="0" smtClean="0">
+                <a:latin typeface="HGPSoeiKakugothicUB" charset="-128"/>
+                <a:ea typeface="HGPSoeiKakugothicUB" charset="-128"/>
+                <a:cs typeface="HGPSoeiKakugothicUB" charset="-128"/>
+              </a:rPr>
+              <a:t>1</a:t>
+            </a:r>
+            <a:r>
+              <a:rPr lang="ja-JP" altLang="en-US" sz="1200" dirty="0">
+                <a:latin typeface="HGPSoeiKakugothicUB" charset="-128"/>
+                <a:ea typeface="HGPSoeiKakugothicUB" charset="-128"/>
+                <a:cs typeface="HGPSoeiKakugothicUB" charset="-128"/>
+              </a:rPr>
+              <a:t>のビュー</a:t>
+            </a:r>
+            <a:endParaRPr kumimoji="1" lang="ja-JP" altLang="en-US" sz="1200" baseline="-25000" dirty="0">
+              <a:latin typeface="HGPSoeiKakugothicUB" charset="-128"/>
+              <a:ea typeface="HGPSoeiKakugothicUB" charset="-128"/>
+              <a:cs typeface="HGPSoeiKakugothicUB" charset="-128"/>
+            </a:endParaRPr>
+          </a:p>
+        </p:txBody>
+      </p:sp>
+      <p:sp>
+        <p:nvSpPr>
+          <p:cNvPr id="73" name="正方形/長方形 72"/>
+          <p:cNvSpPr/>
+          <p:nvPr/>
+        </p:nvSpPr>
+        <p:spPr>
+          <a:xfrm>
+            <a:off x="3397258" y="1718372"/>
+            <a:ext cx="3702633" cy="1901509"/>
+          </a:xfrm>
+          <a:prstGeom prst="rect">
+            <a:avLst/>
+          </a:prstGeom>
+          <a:noFill/>
+          <a:ln>
+            <a:solidFill>
+              <a:schemeClr val="tx1"/>
+            </a:solidFill>
+            <a:prstDash val="sysDash"/>
+          </a:ln>
+        </p:spPr>
+        <p:style>
+          <a:lnRef idx="2">
+            <a:schemeClr val="accent1">
+              <a:shade val="50000"/>
+            </a:schemeClr>
+          </a:lnRef>
+          <a:fillRef idx="1">
+            <a:schemeClr val="accent1"/>
+          </a:fillRef>
+          <a:effectRef idx="0">
+            <a:schemeClr val="accent1"/>
+          </a:effectRef>
+          <a:fontRef idx="minor">
+            <a:schemeClr val="lt1"/>
+          </a:fontRef>
+        </p:style>
+        <p:txBody>
+          <a:bodyPr rtlCol="0" anchor="ctr"/>
+          <a:lstStyle/>
+          <a:p>
+            <a:pPr algn="ctr"/>
+            <a:endParaRPr kumimoji="1" lang="ja-JP" altLang="en-US"/>
+          </a:p>
+        </p:txBody>
+      </p:sp>
+      <p:sp>
+        <p:nvSpPr>
+          <p:cNvPr id="75" name="テキスト ボックス 74"/>
+          <p:cNvSpPr txBox="1"/>
+          <p:nvPr/>
+        </p:nvSpPr>
+        <p:spPr>
+          <a:xfrm>
+            <a:off x="3354592" y="1438950"/>
+            <a:ext cx="949299" cy="276999"/>
+          </a:xfrm>
+          <a:prstGeom prst="rect">
+            <a:avLst/>
+          </a:prstGeom>
+          <a:noFill/>
+        </p:spPr>
+        <p:txBody>
+          <a:bodyPr wrap="none" rtlCol="0">
+            <a:spAutoFit/>
+          </a:bodyPr>
+          <a:lstStyle/>
+          <a:p>
+            <a:r>
+              <a:rPr kumimoji="1" lang="en-US" altLang="ja-JP" sz="1200" dirty="0" smtClean="0">
+                <a:latin typeface="HGPSoeiKakugothicUB" charset="-128"/>
+                <a:ea typeface="HGPSoeiKakugothicUB" charset="-128"/>
+                <a:cs typeface="HGPSoeiKakugothicUB" charset="-128"/>
+              </a:rPr>
+              <a:t>FO</a:t>
+            </a:r>
+            <a:r>
+              <a:rPr kumimoji="1" lang="en-US" altLang="ja-JP" sz="1200" baseline="-25000" dirty="0" smtClean="0">
+                <a:latin typeface="HGPSoeiKakugothicUB" charset="-128"/>
+                <a:ea typeface="HGPSoeiKakugothicUB" charset="-128"/>
+                <a:cs typeface="HGPSoeiKakugothicUB" charset="-128"/>
+              </a:rPr>
+              <a:t>1</a:t>
+            </a:r>
+            <a:r>
+              <a:rPr lang="ja-JP" altLang="en-US" sz="1200" dirty="0">
+                <a:latin typeface="HGPSoeiKakugothicUB" charset="-128"/>
+                <a:ea typeface="HGPSoeiKakugothicUB" charset="-128"/>
+                <a:cs typeface="HGPSoeiKakugothicUB" charset="-128"/>
+              </a:rPr>
+              <a:t>のビュー</a:t>
+            </a:r>
+            <a:endParaRPr kumimoji="1" lang="ja-JP" altLang="en-US" sz="1200" baseline="-25000" dirty="0">
+              <a:latin typeface="HGPSoeiKakugothicUB" charset="-128"/>
+              <a:ea typeface="HGPSoeiKakugothicUB" charset="-128"/>
+              <a:cs typeface="HGPSoeiKakugothicUB" charset="-128"/>
+            </a:endParaRPr>
+          </a:p>
+        </p:txBody>
+      </p:sp>
+      <p:sp>
+        <p:nvSpPr>
+          <p:cNvPr id="76" name="正方形/長方形 75"/>
+          <p:cNvSpPr/>
+          <p:nvPr/>
+        </p:nvSpPr>
+        <p:spPr>
+          <a:xfrm>
+            <a:off x="1753953" y="3942128"/>
+            <a:ext cx="1918938" cy="1433719"/>
+          </a:xfrm>
+          <a:prstGeom prst="rect">
+            <a:avLst/>
+          </a:prstGeom>
+          <a:noFill/>
+          <a:ln>
+            <a:solidFill>
+              <a:schemeClr val="tx1"/>
+            </a:solidFill>
+            <a:prstDash val="sysDash"/>
+          </a:ln>
+        </p:spPr>
+        <p:style>
+          <a:lnRef idx="2">
+            <a:schemeClr val="accent1">
+              <a:shade val="50000"/>
+            </a:schemeClr>
+          </a:lnRef>
+          <a:fillRef idx="1">
+            <a:schemeClr val="accent1"/>
+          </a:fillRef>
+          <a:effectRef idx="0">
+            <a:schemeClr val="accent1"/>
+          </a:effectRef>
+          <a:fontRef idx="minor">
+            <a:schemeClr val="lt1"/>
+          </a:fontRef>
+        </p:style>
+        <p:txBody>
+          <a:bodyPr rtlCol="0" anchor="ctr"/>
+          <a:lstStyle/>
+          <a:p>
+            <a:pPr algn="ctr"/>
+            <a:endParaRPr kumimoji="1" lang="ja-JP" altLang="en-US"/>
+          </a:p>
+        </p:txBody>
+      </p:sp>
+      <p:sp>
+        <p:nvSpPr>
+          <p:cNvPr id="7" name="角丸四角形吹き出し 6"/>
+          <p:cNvSpPr/>
+          <p:nvPr/>
+        </p:nvSpPr>
+        <p:spPr>
+          <a:xfrm>
+            <a:off x="4772794" y="3883239"/>
+            <a:ext cx="1193400" cy="335870"/>
+          </a:xfrm>
+          <a:prstGeom prst="wedgeRoundRectCallout">
+            <a:avLst>
+              <a:gd name="adj1" fmla="val -28726"/>
+              <a:gd name="adj2" fmla="val -173633"/>
+              <a:gd name="adj3" fmla="val 16667"/>
+            </a:avLst>
+          </a:prstGeom>
+        </p:spPr>
+        <p:style>
+          <a:lnRef idx="1">
+            <a:schemeClr val="accent1"/>
+          </a:lnRef>
+          <a:fillRef idx="2">
+            <a:schemeClr val="accent1"/>
+          </a:fillRef>
+          <a:effectRef idx="1">
+            <a:schemeClr val="accent1"/>
+          </a:effectRef>
+          <a:fontRef idx="minor">
+            <a:schemeClr val="dk1"/>
+          </a:fontRef>
+        </p:style>
+        <p:txBody>
+          <a:bodyPr rtlCol="0" anchor="ctr"/>
+          <a:lstStyle/>
+          <a:p>
+            <a:pPr algn="ctr"/>
+            <a:r>
+              <a:rPr kumimoji="1" lang="ja-JP" altLang="en-US" sz="1200" smtClean="0"/>
+              <a:t>仮想デバイス</a:t>
+            </a:r>
+            <a:endParaRPr kumimoji="1" lang="ja-JP" altLang="en-US" sz="1200" dirty="0"/>
+          </a:p>
+        </p:txBody>
+      </p:sp>
+      <p:sp>
+        <p:nvSpPr>
+          <p:cNvPr id="77" name="角丸四角形吹き出し 76"/>
+          <p:cNvSpPr/>
+          <p:nvPr/>
+        </p:nvSpPr>
+        <p:spPr>
+          <a:xfrm>
+            <a:off x="4021814" y="4991496"/>
+            <a:ext cx="1193400" cy="335870"/>
+          </a:xfrm>
+          <a:prstGeom prst="wedgeRoundRectCallout">
+            <a:avLst>
+              <a:gd name="adj1" fmla="val -84064"/>
+              <a:gd name="adj2" fmla="val 4085"/>
+              <a:gd name="adj3" fmla="val 16667"/>
+            </a:avLst>
+          </a:prstGeom>
+        </p:spPr>
+        <p:style>
+          <a:lnRef idx="1">
+            <a:schemeClr val="accent2"/>
+          </a:lnRef>
+          <a:fillRef idx="2">
+            <a:schemeClr val="accent2"/>
+          </a:fillRef>
+          <a:effectRef idx="1">
+            <a:schemeClr val="accent2"/>
+          </a:effectRef>
+          <a:fontRef idx="minor">
+            <a:schemeClr val="dk1"/>
+          </a:fontRef>
+        </p:style>
+        <p:txBody>
+          <a:bodyPr rtlCol="0" anchor="ctr"/>
+          <a:lstStyle/>
+          <a:p>
+            <a:pPr algn="ctr"/>
+            <a:r>
+              <a:rPr kumimoji="1" lang="ja-JP" altLang="en-US" sz="1200" smtClean="0"/>
+              <a:t>物理デバイス</a:t>
+            </a:r>
+            <a:endParaRPr kumimoji="1" lang="ja-JP" altLang="en-US" sz="1200" dirty="0"/>
+          </a:p>
+        </p:txBody>
+      </p:sp>
+      <p:sp>
+        <p:nvSpPr>
+          <p:cNvPr id="78" name="正方形/長方形 77"/>
+          <p:cNvSpPr/>
+          <p:nvPr/>
+        </p:nvSpPr>
+        <p:spPr>
+          <a:xfrm>
+            <a:off x="6075590" y="2214465"/>
+            <a:ext cx="644934" cy="512286"/>
+          </a:xfrm>
+          <a:prstGeom prst="rect">
+            <a:avLst/>
+          </a:prstGeom>
+          <a:solidFill>
+            <a:schemeClr val="accent6">
+              <a:lumMod val="60000"/>
+              <a:lumOff val="40000"/>
+            </a:schemeClr>
+          </a:solidFill>
+        </p:spPr>
+        <p:style>
+          <a:lnRef idx="2">
+            <a:schemeClr val="accent6">
+              <a:shade val="50000"/>
+            </a:schemeClr>
+          </a:lnRef>
+          <a:fillRef idx="1">
+            <a:schemeClr val="accent6"/>
+          </a:fillRef>
+          <a:effectRef idx="0">
+            <a:schemeClr val="accent6"/>
+          </a:effectRef>
+          <a:fontRef idx="minor">
+            <a:schemeClr val="lt1"/>
+          </a:fontRef>
+        </p:style>
+        <p:txBody>
+          <a:bodyPr rtlCol="0" anchor="ctr"/>
+          <a:lstStyle/>
+          <a:p>
+            <a:pPr algn="ctr"/>
+            <a:endParaRPr kumimoji="1" lang="ja-JP" altLang="en-US"/>
+          </a:p>
+        </p:txBody>
+      </p:sp>
+      <p:sp>
+        <p:nvSpPr>
+          <p:cNvPr id="79" name="テキスト ボックス 78"/>
+          <p:cNvSpPr txBox="1"/>
+          <p:nvPr/>
+        </p:nvSpPr>
+        <p:spPr>
+          <a:xfrm>
+            <a:off x="6008409" y="1955991"/>
+            <a:ext cx="878767" cy="276999"/>
+          </a:xfrm>
+          <a:prstGeom prst="rect">
+            <a:avLst/>
+          </a:prstGeom>
+          <a:noFill/>
+        </p:spPr>
+        <p:txBody>
+          <a:bodyPr wrap="none" rtlCol="0">
+            <a:spAutoFit/>
+          </a:bodyPr>
+          <a:lstStyle/>
+          <a:p>
+            <a:r>
+              <a:rPr kumimoji="1" lang="ja-JP" altLang="en-US" sz="1200" dirty="0" smtClean="0">
+                <a:latin typeface="HGPSoeiKakugothicUB" charset="-128"/>
+                <a:ea typeface="HGPSoeiKakugothicUB" charset="-128"/>
+                <a:cs typeface="HGPSoeiKakugothicUB" charset="-128"/>
+              </a:rPr>
+              <a:t>オーダー</a:t>
+            </a:r>
+            <a:r>
+              <a:rPr kumimoji="1" lang="en-US" altLang="ja-JP" sz="1200" dirty="0" smtClean="0">
+                <a:latin typeface="HGPSoeiKakugothicUB" charset="-128"/>
+                <a:ea typeface="HGPSoeiKakugothicUB" charset="-128"/>
+                <a:cs typeface="HGPSoeiKakugothicUB" charset="-128"/>
+              </a:rPr>
+              <a:t>O</a:t>
+            </a:r>
+            <a:r>
+              <a:rPr kumimoji="1" lang="en-US" altLang="ja-JP" sz="1200" baseline="-25000" dirty="0" smtClean="0">
+                <a:latin typeface="HGPSoeiKakugothicUB" charset="-128"/>
+                <a:ea typeface="HGPSoeiKakugothicUB" charset="-128"/>
+                <a:cs typeface="HGPSoeiKakugothicUB" charset="-128"/>
+              </a:rPr>
+              <a:t>1</a:t>
+            </a:r>
+            <a:endParaRPr kumimoji="1" lang="en-US" altLang="ja-JP" sz="1200" baseline="-25000" dirty="0" smtClean="0">
+              <a:latin typeface="HGPSoeiKakugothicUB" charset="-128"/>
+              <a:ea typeface="HGPSoeiKakugothicUB" charset="-128"/>
+              <a:cs typeface="HGPSoeiKakugothicUB" charset="-128"/>
+            </a:endParaRPr>
+          </a:p>
+        </p:txBody>
+      </p:sp>
+      <p:cxnSp>
+        <p:nvCxnSpPr>
+          <p:cNvPr id="90" name="直線矢印コネクタ 89"/>
+          <p:cNvCxnSpPr>
+            <a:endCxn id="80" idx="1"/>
+          </p:cNvCxnSpPr>
+          <p:nvPr/>
+        </p:nvCxnSpPr>
+        <p:spPr>
+          <a:xfrm>
+            <a:off x="6720524" y="2470608"/>
+            <a:ext cx="888963" cy="0"/>
+          </a:xfrm>
+          <a:prstGeom prst="straightConnector1">
+            <a:avLst/>
+          </a:prstGeom>
+          <a:ln>
+            <a:solidFill>
+              <a:schemeClr val="tx1"/>
+            </a:solidFill>
+            <a:headEnd type="none" w="med" len="med"/>
+            <a:tailEnd type="arrow" w="med" len="med"/>
+          </a:ln>
+        </p:spPr>
+        <p:style>
+          <a:lnRef idx="1">
+            <a:schemeClr val="accent1"/>
+          </a:lnRef>
+          <a:fillRef idx="0">
+            <a:schemeClr val="accent1"/>
+          </a:fillRef>
+          <a:effectRef idx="0">
+            <a:schemeClr val="accent1"/>
+          </a:effectRef>
+          <a:fontRef idx="minor">
+            <a:schemeClr val="tx1"/>
+          </a:fontRef>
+        </p:style>
+      </p:cxnSp>
+    </p:spTree>
+    <p:extLst>
+      <p:ext uri="{BB962C8B-B14F-4D97-AF65-F5344CB8AC3E}">
+        <p14:creationId xmlns:p14="http://schemas.microsoft.com/office/powerpoint/2010/main" val="1696721019"/>
+      </p:ext>
+    </p:extLst>
+  </p:cSld>
+  <p:clrMapOvr>
+    <a:masterClrMapping/>
+  </p:clrMapOvr>
+</p:sld>
+</file>
+
 <file path=ppt/theme/theme1.xml><?xml version="1.0" encoding="utf-8"?>
 <a:theme xmlns:a="http://schemas.openxmlformats.org/drawingml/2006/main" name="ホワイト">
   <a:themeElements>

</xml_diff>

<commit_message>
add change log and modify license
</commit_message>
<xml_diff>
--- a/tutorial/ja/images/figures.pptx
+++ b/tutorial/ja/images/figures.pptx
@@ -9045,11 +9045,7 @@
           <a:p>
             <a:r>
               <a:rPr lang="ja-JP" altLang="en-US" dirty="0" smtClean="0"/>
-              <a:t>ファームへのデバイス</a:t>
-            </a:r>
-            <a:r>
-              <a:rPr lang="ja-JP" altLang="en-US" smtClean="0"/>
-              <a:t>登録とレシピからのオーダー生成</a:t>
+              <a:t>ファームへのデバイス登録とレシピからのオーダー生成</a:t>
             </a:r>
             <a:endParaRPr kumimoji="1" lang="ja-JP" altLang="en-US" dirty="0"/>
           </a:p>
@@ -12189,11 +12185,7 @@
           <a:p>
             <a:r>
               <a:rPr lang="ja-JP" altLang="en-US" dirty="0" smtClean="0"/>
-              <a:t>オーダーの</a:t>
-            </a:r>
-            <a:r>
-              <a:rPr lang="ja-JP" altLang="en-US" smtClean="0"/>
-              <a:t>承認とセンサデータの送信</a:t>
+              <a:t>オーダーの承認とセンサデータの送信</a:t>
             </a:r>
             <a:endParaRPr kumimoji="1" lang="ja-JP" altLang="en-US" dirty="0"/>
           </a:p>
@@ -15384,6 +15376,36 @@
           </a:p>
         </p:txBody>
       </p:sp>
+      <p:sp>
+        <p:nvSpPr>
+          <p:cNvPr id="13" name="テキスト ボックス 12"/>
+          <p:cNvSpPr txBox="1"/>
+          <p:nvPr/>
+        </p:nvSpPr>
+        <p:spPr>
+          <a:xfrm>
+            <a:off x="2897071" y="5756129"/>
+            <a:ext cx="6997428" cy="369332"/>
+          </a:xfrm>
+          <a:prstGeom prst="rect">
+            <a:avLst/>
+          </a:prstGeom>
+          <a:noFill/>
+        </p:spPr>
+        <p:txBody>
+          <a:bodyPr wrap="none" rtlCol="0">
+            <a:spAutoFit/>
+          </a:bodyPr>
+          <a:lstStyle/>
+          <a:p>
+            <a:r>
+              <a:rPr lang="en-US" altLang="ja-JP"/>
+              <a:t>Register devices into Farms and an Order created from a Recipe</a:t>
+            </a:r>
+            <a:endParaRPr kumimoji="1" lang="ja-JP" altLang="en-US" dirty="0"/>
+          </a:p>
+        </p:txBody>
+      </p:sp>
     </p:spTree>
     <p:extLst>
       <p:ext uri="{BB962C8B-B14F-4D97-AF65-F5344CB8AC3E}">
@@ -18579,6 +18601,44 @@
               <a:ea typeface="Calibri" charset="0"/>
               <a:cs typeface="Calibri" charset="0"/>
             </a:endParaRPr>
+          </a:p>
+        </p:txBody>
+      </p:sp>
+      <p:sp>
+        <p:nvSpPr>
+          <p:cNvPr id="3" name="テキスト ボックス 2"/>
+          <p:cNvSpPr txBox="1"/>
+          <p:nvPr/>
+        </p:nvSpPr>
+        <p:spPr>
+          <a:xfrm>
+            <a:off x="3703787" y="6064889"/>
+            <a:ext cx="4743606" cy="369332"/>
+          </a:xfrm>
+          <a:prstGeom prst="rect">
+            <a:avLst/>
+          </a:prstGeom>
+          <a:noFill/>
+        </p:spPr>
+        <p:txBody>
+          <a:bodyPr wrap="none" rtlCol="0">
+            <a:spAutoFit/>
+          </a:bodyPr>
+          <a:lstStyle/>
+          <a:p>
+            <a:r>
+              <a:rPr lang="en-US" altLang="ja-JP" dirty="0"/>
+              <a:t>Order acceptance and sensor </a:t>
+            </a:r>
+            <a:r>
+              <a:rPr lang="en-US" altLang="ja-JP"/>
+              <a:t>data </a:t>
+            </a:r>
+            <a:r>
+              <a:rPr lang="en-US" altLang="ja-JP" smtClean="0"/>
+              <a:t>transfer</a:t>
+            </a:r>
+            <a:endParaRPr lang="ja-JP" altLang="ja-JP" dirty="0"/>
           </a:p>
         </p:txBody>
       </p:sp>

</xml_diff>